<commit_message>
Updated slide deck for logstash presentation
</commit_message>
<xml_diff>
--- a/Logstash/Logstash slide deck.pptx
+++ b/Logstash/Logstash slide deck.pptx
@@ -5,21 +5,26 @@
     <p:sldMasterId id="2147483648" r:id="rId1"/>
   </p:sldMasterIdLst>
   <p:notesMasterIdLst>
-    <p:notesMasterId r:id="rId11"/>
+    <p:notesMasterId r:id="rId16"/>
   </p:notesMasterIdLst>
   <p:handoutMasterIdLst>
-    <p:handoutMasterId r:id="rId12"/>
+    <p:handoutMasterId r:id="rId17"/>
   </p:handoutMasterIdLst>
   <p:sldIdLst>
     <p:sldId id="259" r:id="rId2"/>
     <p:sldId id="263" r:id="rId3"/>
-    <p:sldId id="264" r:id="rId4"/>
-    <p:sldId id="265" r:id="rId5"/>
-    <p:sldId id="260" r:id="rId6"/>
-    <p:sldId id="266" r:id="rId7"/>
-    <p:sldId id="268" r:id="rId8"/>
-    <p:sldId id="262" r:id="rId9"/>
-    <p:sldId id="267" r:id="rId10"/>
+    <p:sldId id="269" r:id="rId4"/>
+    <p:sldId id="270" r:id="rId5"/>
+    <p:sldId id="264" r:id="rId6"/>
+    <p:sldId id="265" r:id="rId7"/>
+    <p:sldId id="260" r:id="rId8"/>
+    <p:sldId id="266" r:id="rId9"/>
+    <p:sldId id="268" r:id="rId10"/>
+    <p:sldId id="262" r:id="rId11"/>
+    <p:sldId id="267" r:id="rId12"/>
+    <p:sldId id="272" r:id="rId13"/>
+    <p:sldId id="273" r:id="rId14"/>
+    <p:sldId id="271" r:id="rId15"/>
   </p:sldIdLst>
   <p:sldSz cx="9144000" cy="6858000" type="screen4x3"/>
   <p:notesSz cx="6858000" cy="9144000"/>
@@ -125,6 +130,8 @@
           <p14:sldIdLst>
             <p14:sldId id="259"/>
             <p14:sldId id="263"/>
+            <p14:sldId id="269"/>
+            <p14:sldId id="270"/>
             <p14:sldId id="264"/>
             <p14:sldId id="265"/>
             <p14:sldId id="260"/>
@@ -132,6 +139,9 @@
             <p14:sldId id="268"/>
             <p14:sldId id="262"/>
             <p14:sldId id="267"/>
+            <p14:sldId id="272"/>
+            <p14:sldId id="273"/>
+            <p14:sldId id="271"/>
           </p14:sldIdLst>
         </p14:section>
         <p14:section name="Overview and Objectives" id="{ABA716BF-3A5C-4ADB-94C9-CFEF84EBA240}">
@@ -7844,7 +7854,7 @@
             <a:fld id="{D83FDC75-7F73-4A4A-A77C-09AADF00E0EA}" type="datetimeFigureOut">
               <a:rPr lang="en-US" smtClean="0"/>
               <a:pPr/>
-              <a:t>1/28/14</a:t>
+              <a:t>1/31/14</a:t>
             </a:fld>
             <a:endParaRPr lang="en-US" dirty="0"/>
           </a:p>
@@ -8011,7 +8021,7 @@
             <a:fld id="{48AEF76B-3757-4A0B-AF93-28494465C1DD}" type="datetimeFigureOut">
               <a:rPr lang="en-US" smtClean="0"/>
               <a:pPr/>
-              <a:t>1/28/14</a:t>
+              <a:t>1/31/14</a:t>
             </a:fld>
             <a:endParaRPr lang="en-US" dirty="0"/>
           </a:p>
@@ -8716,7 +8726,7 @@
             <a:fld id="{757B281C-5159-4971-8228-52B9A72E9ED2}" type="datetimeFigureOut">
               <a:rPr lang="en-US" smtClean="0"/>
               <a:pPr/>
-              <a:t>1/28/14</a:t>
+              <a:t>1/31/14</a:t>
             </a:fld>
             <a:endParaRPr lang="en-US" dirty="0"/>
           </a:p>
@@ -8823,7 +8833,7 @@
             <a:fld id="{757B281C-5159-4971-8228-52B9A72E9ED2}" type="datetimeFigureOut">
               <a:rPr lang="en-US" smtClean="0"/>
               <a:pPr/>
-              <a:t>1/28/14</a:t>
+              <a:t>1/31/14</a:t>
             </a:fld>
             <a:endParaRPr lang="en-US" dirty="0"/>
           </a:p>
@@ -8964,7 +8974,7 @@
             <a:fld id="{757B281C-5159-4971-8228-52B9A72E9ED2}" type="datetimeFigureOut">
               <a:rPr lang="en-US" smtClean="0"/>
               <a:pPr/>
-              <a:t>1/28/14</a:t>
+              <a:t>1/31/14</a:t>
             </a:fld>
             <a:endParaRPr lang="en-US" dirty="0"/>
           </a:p>
@@ -9175,7 +9185,7 @@
             <a:fld id="{757B281C-5159-4971-8228-52B9A72E9ED2}" type="datetimeFigureOut">
               <a:rPr lang="en-US" smtClean="0"/>
               <a:pPr/>
-              <a:t>1/28/14</a:t>
+              <a:t>1/31/14</a:t>
             </a:fld>
             <a:endParaRPr lang="en-US" dirty="0"/>
           </a:p>
@@ -9453,7 +9463,7 @@
             <a:fld id="{757B281C-5159-4971-8228-52B9A72E9ED2}" type="datetimeFigureOut">
               <a:rPr lang="en-US" smtClean="0"/>
               <a:pPr/>
-              <a:t>1/28/14</a:t>
+              <a:t>1/31/14</a:t>
             </a:fld>
             <a:endParaRPr lang="en-US" dirty="0"/>
           </a:p>
@@ -9762,7 +9772,7 @@
             <a:fld id="{757B281C-5159-4971-8228-52B9A72E9ED2}" type="datetimeFigureOut">
               <a:rPr lang="en-US" smtClean="0"/>
               <a:pPr/>
-              <a:t>1/28/14</a:t>
+              <a:t>1/31/14</a:t>
             </a:fld>
             <a:endParaRPr lang="en-US" dirty="0"/>
           </a:p>
@@ -10196,7 +10206,7 @@
             <a:fld id="{757B281C-5159-4971-8228-52B9A72E9ED2}" type="datetimeFigureOut">
               <a:rPr lang="en-US" smtClean="0"/>
               <a:pPr/>
-              <a:t>1/28/14</a:t>
+              <a:t>1/31/14</a:t>
             </a:fld>
             <a:endParaRPr lang="en-US" dirty="0"/>
           </a:p>
@@ -10485,7 +10495,7 @@
             <a:fld id="{757B281C-5159-4971-8228-52B9A72E9ED2}" type="datetimeFigureOut">
               <a:rPr lang="en-US" smtClean="0"/>
               <a:pPr/>
-              <a:t>1/28/14</a:t>
+              <a:t>1/31/14</a:t>
             </a:fld>
             <a:endParaRPr lang="en-US" dirty="0"/>
           </a:p>
@@ -10754,7 +10764,7 @@
             <a:fld id="{757B281C-5159-4971-8228-52B9A72E9ED2}" type="datetimeFigureOut">
               <a:rPr lang="en-US" smtClean="0"/>
               <a:pPr/>
-              <a:t>1/28/14</a:t>
+              <a:t>1/31/14</a:t>
             </a:fld>
             <a:endParaRPr lang="en-US" dirty="0"/>
           </a:p>
@@ -10945,7 +10955,7 @@
             <a:fld id="{757B281C-5159-4971-8228-52B9A72E9ED2}" type="datetimeFigureOut">
               <a:rPr lang="en-US" smtClean="0"/>
               <a:pPr/>
-              <a:t>1/28/14</a:t>
+              <a:t>1/31/14</a:t>
             </a:fld>
             <a:endParaRPr lang="en-US" dirty="0"/>
           </a:p>
@@ -11137,7 +11147,7 @@
             <a:fld id="{757B281C-5159-4971-8228-52B9A72E9ED2}" type="datetimeFigureOut">
               <a:rPr lang="en-US" smtClean="0"/>
               <a:pPr/>
-              <a:t>1/28/14</a:t>
+              <a:t>1/31/14</a:t>
             </a:fld>
             <a:endParaRPr lang="en-US" dirty="0"/>
           </a:p>
@@ -11928,780 +11938,7 @@
 </p:sld>
 </file>
 
-<file path=ppt/slides/slide2.xml><?xml version="1.0" encoding="utf-8"?>
-<p:sld xmlns:a="http://schemas.openxmlformats.org/drawingml/2006/main" xmlns:r="http://schemas.openxmlformats.org/officeDocument/2006/relationships" xmlns:p="http://schemas.openxmlformats.org/presentationml/2006/main">
-  <p:cSld>
-    <p:spTree>
-      <p:nvGrpSpPr>
-        <p:cNvPr id="1" name=""/>
-        <p:cNvGrpSpPr/>
-        <p:nvPr/>
-      </p:nvGrpSpPr>
-      <p:grpSpPr>
-        <a:xfrm>
-          <a:off x="0" y="0"/>
-          <a:ext cx="0" cy="0"/>
-          <a:chOff x="0" y="0"/>
-          <a:chExt cx="0" cy="0"/>
-        </a:xfrm>
-      </p:grpSpPr>
-      <p:sp>
-        <p:nvSpPr>
-          <p:cNvPr id="2" name="Title 1"/>
-          <p:cNvSpPr>
-            <a:spLocks noGrp="1"/>
-          </p:cNvSpPr>
-          <p:nvPr>
-            <p:ph type="title"/>
-          </p:nvPr>
-        </p:nvSpPr>
-        <p:spPr/>
-        <p:txBody>
-          <a:bodyPr/>
-          <a:lstStyle/>
-          <a:p>
-            <a:pPr algn="ctr"/>
-            <a:r>
-              <a:rPr lang="en-US" dirty="0" smtClean="0"/>
-              <a:t>Old school logging</a:t>
-            </a:r>
-            <a:endParaRPr lang="en-US" dirty="0"/>
-          </a:p>
-        </p:txBody>
-      </p:sp>
-      <p:sp>
-        <p:nvSpPr>
-          <p:cNvPr id="3" name="Vertical Text Placeholder 2"/>
-          <p:cNvSpPr>
-            <a:spLocks noGrp="1"/>
-          </p:cNvSpPr>
-          <p:nvPr>
-            <p:ph type="body" orient="vert" idx="1"/>
-          </p:nvPr>
-        </p:nvSpPr>
-        <p:spPr/>
-        <p:txBody>
-          <a:bodyPr/>
-          <a:lstStyle/>
-          <a:p>
-            <a:r>
-              <a:rPr lang="en-US" dirty="0" smtClean="0"/>
-              <a:t>When you are told to go look at the logs</a:t>
-            </a:r>
-          </a:p>
-          <a:p>
-            <a:pPr lvl="1"/>
-            <a:r>
-              <a:rPr lang="en-US" dirty="0" smtClean="0"/>
-              <a:t>cat, tail, </a:t>
-            </a:r>
-            <a:r>
-              <a:rPr lang="en-US" dirty="0" err="1" smtClean="0"/>
-              <a:t>grep</a:t>
-            </a:r>
-            <a:r>
-              <a:rPr lang="en-US" dirty="0" smtClean="0"/>
-              <a:t>, </a:t>
-            </a:r>
-            <a:r>
-              <a:rPr lang="en-US" dirty="0" err="1" smtClean="0"/>
-              <a:t>sed</a:t>
-            </a:r>
-            <a:r>
-              <a:rPr lang="en-US" dirty="0" smtClean="0"/>
-              <a:t>, </a:t>
-            </a:r>
-            <a:r>
-              <a:rPr lang="en-US" dirty="0" err="1" smtClean="0"/>
-              <a:t>awk</a:t>
-            </a:r>
-            <a:r>
-              <a:rPr lang="en-US" dirty="0" smtClean="0"/>
-              <a:t>, …..</a:t>
-            </a:r>
-          </a:p>
-          <a:p>
-            <a:pPr lvl="1"/>
-            <a:r>
-              <a:rPr lang="en-US" dirty="0" smtClean="0"/>
-              <a:t>regular expressions</a:t>
-            </a:r>
-          </a:p>
-          <a:p>
-            <a:pPr lvl="1"/>
-            <a:endParaRPr lang="en-US" dirty="0"/>
-          </a:p>
-          <a:p>
-            <a:r>
-              <a:rPr lang="en-US" dirty="0" smtClean="0"/>
-              <a:t>Does not scale</a:t>
-            </a:r>
-          </a:p>
-          <a:p>
-            <a:pPr lvl="1"/>
-            <a:r>
-              <a:rPr lang="en-US" dirty="0" smtClean="0"/>
-              <a:t>More than one server</a:t>
-            </a:r>
-          </a:p>
-          <a:p>
-            <a:pPr lvl="1"/>
-            <a:r>
-              <a:rPr lang="en-US" dirty="0" smtClean="0"/>
-              <a:t>Many sources within any given server</a:t>
-            </a:r>
-          </a:p>
-          <a:p>
-            <a:pPr lvl="1"/>
-            <a:r>
-              <a:rPr lang="en-US" dirty="0" smtClean="0"/>
-              <a:t>Different time zones for different servers</a:t>
-            </a:r>
-          </a:p>
-          <a:p>
-            <a:pPr lvl="1"/>
-            <a:endParaRPr lang="en-US" dirty="0" smtClean="0"/>
-          </a:p>
-        </p:txBody>
-      </p:sp>
-    </p:spTree>
-    <p:extLst>
-      <p:ext uri="{BB962C8B-B14F-4D97-AF65-F5344CB8AC3E}">
-        <p14:creationId xmlns:p14="http://schemas.microsoft.com/office/powerpoint/2010/main" val="3100135462"/>
-      </p:ext>
-    </p:extLst>
-  </p:cSld>
-  <p:clrMapOvr>
-    <a:masterClrMapping/>
-  </p:clrMapOvr>
-  <mc:AlternateContent xmlns:mc="http://schemas.openxmlformats.org/markup-compatibility/2006" xmlns:p14="http://schemas.microsoft.com/office/powerpoint/2010/main">
-    <mc:Choice Requires="p14">
-      <p:transition p14:dur="0"/>
-    </mc:Choice>
-    <mc:Fallback xmlns="">
-      <p:transition xmlns:p14="http://schemas.microsoft.com/office/powerpoint/2010/main"/>
-    </mc:Fallback>
-  </mc:AlternateContent>
-</p:sld>
-</file>
-
-<file path=ppt/slides/slide3.xml><?xml version="1.0" encoding="utf-8"?>
-<p:sld xmlns:a="http://schemas.openxmlformats.org/drawingml/2006/main" xmlns:r="http://schemas.openxmlformats.org/officeDocument/2006/relationships" xmlns:p="http://schemas.openxmlformats.org/presentationml/2006/main">
-  <p:cSld>
-    <p:spTree>
-      <p:nvGrpSpPr>
-        <p:cNvPr id="1" name=""/>
-        <p:cNvGrpSpPr/>
-        <p:nvPr/>
-      </p:nvGrpSpPr>
-      <p:grpSpPr>
-        <a:xfrm>
-          <a:off x="0" y="0"/>
-          <a:ext cx="0" cy="0"/>
-          <a:chOff x="0" y="0"/>
-          <a:chExt cx="0" cy="0"/>
-        </a:xfrm>
-      </p:grpSpPr>
-      <p:sp>
-        <p:nvSpPr>
-          <p:cNvPr id="2" name="Title 1"/>
-          <p:cNvSpPr>
-            <a:spLocks noGrp="1"/>
-          </p:cNvSpPr>
-          <p:nvPr>
-            <p:ph type="title"/>
-          </p:nvPr>
-        </p:nvSpPr>
-        <p:spPr/>
-        <p:txBody>
-          <a:bodyPr/>
-          <a:lstStyle/>
-          <a:p>
-            <a:r>
-              <a:rPr lang="en-US" dirty="0" smtClean="0"/>
-              <a:t>System Logs</a:t>
-            </a:r>
-            <a:endParaRPr lang="en-US" dirty="0"/>
-          </a:p>
-        </p:txBody>
-      </p:sp>
-      <p:sp>
-        <p:nvSpPr>
-          <p:cNvPr id="3" name="Vertical Text Placeholder 2"/>
-          <p:cNvSpPr>
-            <a:spLocks noGrp="1"/>
-          </p:cNvSpPr>
-          <p:nvPr>
-            <p:ph type="body" orient="vert" idx="1"/>
-          </p:nvPr>
-        </p:nvSpPr>
-        <p:spPr/>
-        <p:txBody>
-          <a:bodyPr/>
-          <a:lstStyle/>
-          <a:p>
-            <a:pPr marL="0" indent="0" algn="ctr">
-              <a:buNone/>
-            </a:pPr>
-            <a:endParaRPr lang="en-US" dirty="0" smtClean="0"/>
-          </a:p>
-          <a:p>
-            <a:pPr marL="0" indent="0" algn="ctr">
-              <a:buNone/>
-            </a:pPr>
-            <a:r>
-              <a:rPr lang="en-US" dirty="0" smtClean="0"/>
-              <a:t>Consolidate log entries to single location</a:t>
-            </a:r>
-          </a:p>
-          <a:p>
-            <a:pPr marL="0" indent="0">
-              <a:buNone/>
-            </a:pPr>
-            <a:endParaRPr lang="en-US" dirty="0"/>
-          </a:p>
-          <a:p>
-            <a:pPr marL="0" indent="0" algn="ctr">
-              <a:buNone/>
-            </a:pPr>
-            <a:r>
-              <a:rPr lang="en-US" dirty="0" smtClean="0"/>
-              <a:t>Now, the problem turns from too little information to one of too much information and too little context</a:t>
-            </a:r>
-            <a:endParaRPr lang="en-US" dirty="0"/>
-          </a:p>
-        </p:txBody>
-      </p:sp>
-    </p:spTree>
-    <p:extLst>
-      <p:ext uri="{BB962C8B-B14F-4D97-AF65-F5344CB8AC3E}">
-        <p14:creationId xmlns:p14="http://schemas.microsoft.com/office/powerpoint/2010/main" val="706661088"/>
-      </p:ext>
-    </p:extLst>
-  </p:cSld>
-  <p:clrMapOvr>
-    <a:masterClrMapping/>
-  </p:clrMapOvr>
-  <mc:AlternateContent xmlns:mc="http://schemas.openxmlformats.org/markup-compatibility/2006" xmlns:p14="http://schemas.microsoft.com/office/powerpoint/2010/main">
-    <mc:Choice Requires="p14">
-      <p:transition p14:dur="0"/>
-    </mc:Choice>
-    <mc:Fallback xmlns="">
-      <p:transition xmlns:p14="http://schemas.microsoft.com/office/powerpoint/2010/main"/>
-    </mc:Fallback>
-  </mc:AlternateContent>
-</p:sld>
-</file>
-
-<file path=ppt/slides/slide4.xml><?xml version="1.0" encoding="utf-8"?>
-<p:sld xmlns:a="http://schemas.openxmlformats.org/drawingml/2006/main" xmlns:r="http://schemas.openxmlformats.org/officeDocument/2006/relationships" xmlns:p="http://schemas.openxmlformats.org/presentationml/2006/main">
-  <p:cSld>
-    <p:spTree>
-      <p:nvGrpSpPr>
-        <p:cNvPr id="1" name=""/>
-        <p:cNvGrpSpPr/>
-        <p:nvPr/>
-      </p:nvGrpSpPr>
-      <p:grpSpPr>
-        <a:xfrm>
-          <a:off x="0" y="0"/>
-          <a:ext cx="0" cy="0"/>
-          <a:chOff x="0" y="0"/>
-          <a:chExt cx="0" cy="0"/>
-        </a:xfrm>
-      </p:grpSpPr>
-      <p:sp>
-        <p:nvSpPr>
-          <p:cNvPr id="2" name="Title 1"/>
-          <p:cNvSpPr>
-            <a:spLocks noGrp="1"/>
-          </p:cNvSpPr>
-          <p:nvPr>
-            <p:ph type="title"/>
-          </p:nvPr>
-        </p:nvSpPr>
-        <p:spPr/>
-        <p:txBody>
-          <a:bodyPr/>
-          <a:lstStyle/>
-          <a:p>
-            <a:r>
-              <a:rPr lang="en-US" dirty="0" err="1" smtClean="0"/>
-              <a:t>Logstash</a:t>
-            </a:r>
-            <a:endParaRPr lang="en-US" dirty="0"/>
-          </a:p>
-        </p:txBody>
-      </p:sp>
-      <p:sp>
-        <p:nvSpPr>
-          <p:cNvPr id="3" name="Vertical Text Placeholder 2"/>
-          <p:cNvSpPr>
-            <a:spLocks noGrp="1"/>
-          </p:cNvSpPr>
-          <p:nvPr>
-            <p:ph type="body" orient="vert" idx="1"/>
-          </p:nvPr>
-        </p:nvSpPr>
-        <p:spPr/>
-        <p:txBody>
-          <a:bodyPr/>
-          <a:lstStyle/>
-          <a:p>
-            <a:pPr marL="0" indent="0" algn="ctr">
-              <a:buNone/>
-            </a:pPr>
-            <a:endParaRPr lang="en-US" dirty="0" smtClean="0"/>
-          </a:p>
-          <a:p>
-            <a:pPr marL="0" indent="0" algn="ctr">
-              <a:buNone/>
-            </a:pPr>
-            <a:r>
-              <a:rPr lang="en-US" dirty="0" smtClean="0"/>
-              <a:t>Open Source Centralized Logging Manager</a:t>
-            </a:r>
-            <a:endParaRPr lang="en-US" dirty="0"/>
-          </a:p>
-          <a:p>
-            <a:pPr marL="0" indent="0" algn="ctr">
-              <a:buNone/>
-            </a:pPr>
-            <a:endParaRPr lang="en-US" dirty="0" smtClean="0"/>
-          </a:p>
-          <a:p>
-            <a:pPr marL="0" indent="0" algn="ctr">
-              <a:buNone/>
-            </a:pPr>
-            <a:r>
-              <a:rPr lang="en-US" dirty="0" smtClean="0"/>
-              <a:t>Apache 2.0 License</a:t>
-            </a:r>
-            <a:endParaRPr lang="en-US" dirty="0"/>
-          </a:p>
-        </p:txBody>
-      </p:sp>
-    </p:spTree>
-    <p:extLst>
-      <p:ext uri="{BB962C8B-B14F-4D97-AF65-F5344CB8AC3E}">
-        <p14:creationId xmlns:p14="http://schemas.microsoft.com/office/powerpoint/2010/main" val="836353226"/>
-      </p:ext>
-    </p:extLst>
-  </p:cSld>
-  <p:clrMapOvr>
-    <a:masterClrMapping/>
-  </p:clrMapOvr>
-  <mc:AlternateContent xmlns:mc="http://schemas.openxmlformats.org/markup-compatibility/2006" xmlns:p14="http://schemas.microsoft.com/office/powerpoint/2010/main">
-    <mc:Choice Requires="p14">
-      <p:transition p14:dur="0"/>
-    </mc:Choice>
-    <mc:Fallback xmlns="">
-      <p:transition xmlns:p14="http://schemas.microsoft.com/office/powerpoint/2010/main"/>
-    </mc:Fallback>
-  </mc:AlternateContent>
-</p:sld>
-</file>
-
-<file path=ppt/slides/slide5.xml><?xml version="1.0" encoding="utf-8"?>
-<p:sld xmlns:a="http://schemas.openxmlformats.org/drawingml/2006/main" xmlns:r="http://schemas.openxmlformats.org/officeDocument/2006/relationships" xmlns:p="http://schemas.openxmlformats.org/presentationml/2006/main">
-  <p:cSld>
-    <p:spTree>
-      <p:nvGrpSpPr>
-        <p:cNvPr id="1" name=""/>
-        <p:cNvGrpSpPr/>
-        <p:nvPr/>
-      </p:nvGrpSpPr>
-      <p:grpSpPr>
-        <a:xfrm>
-          <a:off x="0" y="0"/>
-          <a:ext cx="0" cy="0"/>
-          <a:chOff x="0" y="0"/>
-          <a:chExt cx="0" cy="0"/>
-        </a:xfrm>
-      </p:grpSpPr>
-      <p:sp>
-        <p:nvSpPr>
-          <p:cNvPr id="2" name="Title 1"/>
-          <p:cNvSpPr>
-            <a:spLocks noGrp="1"/>
-          </p:cNvSpPr>
-          <p:nvPr>
-            <p:ph type="title"/>
-          </p:nvPr>
-        </p:nvSpPr>
-        <p:spPr/>
-        <p:txBody>
-          <a:bodyPr/>
-          <a:lstStyle/>
-          <a:p>
-            <a:pPr algn="ctr"/>
-            <a:r>
-              <a:rPr lang="en-US" dirty="0" smtClean="0"/>
-              <a:t>What does </a:t>
-            </a:r>
-            <a:r>
-              <a:rPr lang="en-US" dirty="0" err="1" smtClean="0"/>
-              <a:t>Logstash</a:t>
-            </a:r>
-            <a:r>
-              <a:rPr lang="en-US" dirty="0" smtClean="0"/>
-              <a:t> </a:t>
-            </a:r>
-            <a:r>
-              <a:rPr lang="en-US" dirty="0" smtClean="0"/>
-              <a:t>do?</a:t>
-            </a:r>
-            <a:endParaRPr lang="en-US" dirty="0"/>
-          </a:p>
-        </p:txBody>
-      </p:sp>
-      <p:sp>
-        <p:nvSpPr>
-          <p:cNvPr id="3" name="Vertical Text Placeholder 2"/>
-          <p:cNvSpPr>
-            <a:spLocks noGrp="1"/>
-          </p:cNvSpPr>
-          <p:nvPr>
-            <p:ph type="body" orient="vert" idx="1"/>
-          </p:nvPr>
-        </p:nvSpPr>
-        <p:spPr/>
-        <p:txBody>
-          <a:bodyPr/>
-          <a:lstStyle/>
-          <a:p>
-            <a:pPr marL="0" indent="0" algn="ctr">
-              <a:buNone/>
-            </a:pPr>
-            <a:endParaRPr lang="en-US" dirty="0" smtClean="0"/>
-          </a:p>
-          <a:p>
-            <a:pPr marL="0" indent="0" algn="ctr">
-              <a:buNone/>
-            </a:pPr>
-            <a:r>
-              <a:rPr lang="en-US" dirty="0" smtClean="0"/>
-              <a:t>Ships logs from any source</a:t>
-            </a:r>
-          </a:p>
-          <a:p>
-            <a:pPr marL="0" indent="0" algn="ctr">
-              <a:buNone/>
-            </a:pPr>
-            <a:r>
-              <a:rPr lang="en-US" dirty="0" smtClean="0"/>
-              <a:t>Parse them</a:t>
-            </a:r>
-          </a:p>
-          <a:p>
-            <a:pPr marL="0" indent="0" algn="ctr">
-              <a:buNone/>
-            </a:pPr>
-            <a:r>
-              <a:rPr lang="en-US" dirty="0" smtClean="0"/>
-              <a:t>Get the right timestamp</a:t>
-            </a:r>
-          </a:p>
-          <a:p>
-            <a:pPr marL="0" indent="0" algn="ctr">
-              <a:buNone/>
-            </a:pPr>
-            <a:r>
-              <a:rPr lang="en-US" dirty="0" smtClean="0"/>
-              <a:t>Index them</a:t>
-            </a:r>
-          </a:p>
-          <a:p>
-            <a:pPr marL="0" indent="0" algn="ctr">
-              <a:buNone/>
-            </a:pPr>
-            <a:r>
-              <a:rPr lang="en-US" dirty="0" smtClean="0"/>
-              <a:t>Allows you to search them</a:t>
-            </a:r>
-            <a:endParaRPr lang="en-US" dirty="0"/>
-          </a:p>
-        </p:txBody>
-      </p:sp>
-    </p:spTree>
-    <p:extLst>
-      <p:ext uri="{BB962C8B-B14F-4D97-AF65-F5344CB8AC3E}">
-        <p14:creationId xmlns:p14="http://schemas.microsoft.com/office/powerpoint/2010/main" val="3499055205"/>
-      </p:ext>
-    </p:extLst>
-  </p:cSld>
-  <p:clrMapOvr>
-    <a:masterClrMapping/>
-  </p:clrMapOvr>
-  <mc:AlternateContent xmlns:mc="http://schemas.openxmlformats.org/markup-compatibility/2006" xmlns:p14="http://schemas.microsoft.com/office/powerpoint/2010/main">
-    <mc:Choice Requires="p14">
-      <p:transition p14:dur="0"/>
-    </mc:Choice>
-    <mc:Fallback xmlns="">
-      <p:transition xmlns:p14="http://schemas.microsoft.com/office/powerpoint/2010/main"/>
-    </mc:Fallback>
-  </mc:AlternateContent>
-</p:sld>
-</file>
-
-<file path=ppt/slides/slide6.xml><?xml version="1.0" encoding="utf-8"?>
-<p:sld xmlns:a="http://schemas.openxmlformats.org/drawingml/2006/main" xmlns:r="http://schemas.openxmlformats.org/officeDocument/2006/relationships" xmlns:p="http://schemas.openxmlformats.org/presentationml/2006/main">
-  <p:cSld>
-    <p:spTree>
-      <p:nvGrpSpPr>
-        <p:cNvPr id="1" name=""/>
-        <p:cNvGrpSpPr/>
-        <p:nvPr/>
-      </p:nvGrpSpPr>
-      <p:grpSpPr>
-        <a:xfrm>
-          <a:off x="0" y="0"/>
-          <a:ext cx="0" cy="0"/>
-          <a:chOff x="0" y="0"/>
-          <a:chExt cx="0" cy="0"/>
-        </a:xfrm>
-      </p:grpSpPr>
-      <p:sp>
-        <p:nvSpPr>
-          <p:cNvPr id="2" name="Title 1"/>
-          <p:cNvSpPr>
-            <a:spLocks noGrp="1"/>
-          </p:cNvSpPr>
-          <p:nvPr>
-            <p:ph type="title"/>
-          </p:nvPr>
-        </p:nvSpPr>
-        <p:spPr/>
-        <p:txBody>
-          <a:bodyPr/>
-          <a:lstStyle/>
-          <a:p>
-            <a:r>
-              <a:rPr lang="en-US" dirty="0" smtClean="0"/>
-              <a:t>How does </a:t>
-            </a:r>
-            <a:r>
-              <a:rPr lang="en-US" dirty="0" err="1" smtClean="0"/>
-              <a:t>Logstash</a:t>
-            </a:r>
-            <a:r>
-              <a:rPr lang="en-US" dirty="0" smtClean="0"/>
-              <a:t> get the logs</a:t>
-            </a:r>
-            <a:endParaRPr lang="en-US" dirty="0"/>
-          </a:p>
-        </p:txBody>
-      </p:sp>
-      <p:sp>
-        <p:nvSpPr>
-          <p:cNvPr id="3" name="Vertical Text Placeholder 2"/>
-          <p:cNvSpPr>
-            <a:spLocks noGrp="1"/>
-          </p:cNvSpPr>
-          <p:nvPr>
-            <p:ph type="body" orient="vert" idx="1"/>
-          </p:nvPr>
-        </p:nvSpPr>
-        <p:spPr/>
-        <p:txBody>
-          <a:bodyPr/>
-          <a:lstStyle/>
-          <a:p>
-            <a:r>
-              <a:rPr lang="en-US" dirty="0" smtClean="0"/>
-              <a:t>TCP/UDP</a:t>
-            </a:r>
-          </a:p>
-          <a:p>
-            <a:r>
-              <a:rPr lang="en-US" dirty="0" smtClean="0"/>
-              <a:t>Files</a:t>
-            </a:r>
-          </a:p>
-          <a:p>
-            <a:r>
-              <a:rPr lang="en-US" dirty="0" smtClean="0"/>
-              <a:t>Syslog</a:t>
-            </a:r>
-          </a:p>
-          <a:p>
-            <a:r>
-              <a:rPr lang="en-US" dirty="0" smtClean="0"/>
-              <a:t>Microsoft Windows </a:t>
-            </a:r>
-            <a:r>
-              <a:rPr lang="en-US" dirty="0" err="1" smtClean="0"/>
-              <a:t>EventLogs</a:t>
-            </a:r>
-            <a:endParaRPr lang="en-US" dirty="0" smtClean="0"/>
-          </a:p>
-          <a:p>
-            <a:r>
-              <a:rPr lang="en-US" dirty="0" smtClean="0"/>
-              <a:t>STDIN</a:t>
-            </a:r>
-          </a:p>
-          <a:p>
-            <a:r>
-              <a:rPr lang="en-US" dirty="0" err="1" smtClean="0"/>
-              <a:t>Websocket</a:t>
-            </a:r>
-            <a:endParaRPr lang="en-US" dirty="0" smtClean="0"/>
-          </a:p>
-          <a:p>
-            <a:r>
-              <a:rPr lang="en-US" dirty="0" err="1" smtClean="0"/>
-              <a:t>zeromq</a:t>
-            </a:r>
-            <a:endParaRPr lang="en-US" dirty="0" smtClean="0"/>
-          </a:p>
-          <a:p>
-            <a:r>
-              <a:rPr lang="en-US" dirty="0" smtClean="0"/>
-              <a:t>Plus many more</a:t>
-            </a:r>
-          </a:p>
-          <a:p>
-            <a:r>
-              <a:rPr lang="en-US" dirty="0" smtClean="0"/>
-              <a:t>And it’s extensible (you can write your own)</a:t>
-            </a:r>
-            <a:endParaRPr lang="en-US" dirty="0"/>
-          </a:p>
-        </p:txBody>
-      </p:sp>
-    </p:spTree>
-    <p:extLst>
-      <p:ext uri="{BB962C8B-B14F-4D97-AF65-F5344CB8AC3E}">
-        <p14:creationId xmlns:p14="http://schemas.microsoft.com/office/powerpoint/2010/main" val="714878376"/>
-      </p:ext>
-    </p:extLst>
-  </p:cSld>
-  <p:clrMapOvr>
-    <a:masterClrMapping/>
-  </p:clrMapOvr>
-  <mc:AlternateContent xmlns:mc="http://schemas.openxmlformats.org/markup-compatibility/2006" xmlns:p14="http://schemas.microsoft.com/office/powerpoint/2010/main">
-    <mc:Choice Requires="p14">
-      <p:transition p14:dur="0"/>
-    </mc:Choice>
-    <mc:Fallback xmlns="">
-      <p:transition xmlns:p14="http://schemas.microsoft.com/office/powerpoint/2010/main"/>
-    </mc:Fallback>
-  </mc:AlternateContent>
-</p:sld>
-</file>
-
-<file path=ppt/slides/slide7.xml><?xml version="1.0" encoding="utf-8"?>
-<p:sld xmlns:a="http://schemas.openxmlformats.org/drawingml/2006/main" xmlns:r="http://schemas.openxmlformats.org/officeDocument/2006/relationships" xmlns:p="http://schemas.openxmlformats.org/presentationml/2006/main">
-  <p:cSld>
-    <p:spTree>
-      <p:nvGrpSpPr>
-        <p:cNvPr id="1" name=""/>
-        <p:cNvGrpSpPr/>
-        <p:nvPr/>
-      </p:nvGrpSpPr>
-      <p:grpSpPr>
-        <a:xfrm>
-          <a:off x="0" y="0"/>
-          <a:ext cx="0" cy="0"/>
-          <a:chOff x="0" y="0"/>
-          <a:chExt cx="0" cy="0"/>
-        </a:xfrm>
-      </p:grpSpPr>
-      <p:sp>
-        <p:nvSpPr>
-          <p:cNvPr id="2" name="Title 1"/>
-          <p:cNvSpPr>
-            <a:spLocks noGrp="1"/>
-          </p:cNvSpPr>
-          <p:nvPr>
-            <p:ph type="title"/>
-          </p:nvPr>
-        </p:nvSpPr>
-        <p:spPr/>
-        <p:txBody>
-          <a:bodyPr/>
-          <a:lstStyle/>
-          <a:p>
-            <a:r>
-              <a:rPr lang="en-US" dirty="0" smtClean="0"/>
-              <a:t>Parse the input</a:t>
-            </a:r>
-            <a:endParaRPr lang="en-US" dirty="0"/>
-          </a:p>
-        </p:txBody>
-      </p:sp>
-      <p:sp>
-        <p:nvSpPr>
-          <p:cNvPr id="3" name="Vertical Text Placeholder 2"/>
-          <p:cNvSpPr>
-            <a:spLocks noGrp="1"/>
-          </p:cNvSpPr>
-          <p:nvPr>
-            <p:ph type="body" orient="vert" idx="1"/>
-          </p:nvPr>
-        </p:nvSpPr>
-        <p:spPr/>
-        <p:txBody>
-          <a:bodyPr/>
-          <a:lstStyle/>
-          <a:p>
-            <a:r>
-              <a:rPr lang="en-US" dirty="0" err="1" smtClean="0"/>
-              <a:t>Json</a:t>
-            </a:r>
-            <a:endParaRPr lang="en-US" dirty="0" smtClean="0"/>
-          </a:p>
-          <a:p>
-            <a:r>
-              <a:rPr lang="en-US" dirty="0" err="1" smtClean="0"/>
-              <a:t>Csv</a:t>
-            </a:r>
-            <a:endParaRPr lang="en-US" dirty="0" smtClean="0"/>
-          </a:p>
-          <a:p>
-            <a:r>
-              <a:rPr lang="en-US" dirty="0" smtClean="0"/>
-              <a:t>Xml</a:t>
-            </a:r>
-          </a:p>
-          <a:p>
-            <a:r>
-              <a:rPr lang="en-US" dirty="0" smtClean="0"/>
-              <a:t>Multi-line (Stack traces from file input)</a:t>
-            </a:r>
-          </a:p>
-          <a:p>
-            <a:r>
-              <a:rPr lang="en-US" dirty="0" smtClean="0"/>
-              <a:t>Regex</a:t>
-            </a:r>
-            <a:endParaRPr lang="en-US" dirty="0"/>
-          </a:p>
-        </p:txBody>
-      </p:sp>
-    </p:spTree>
-    <p:extLst>
-      <p:ext uri="{BB962C8B-B14F-4D97-AF65-F5344CB8AC3E}">
-        <p14:creationId xmlns:p14="http://schemas.microsoft.com/office/powerpoint/2010/main" val="3376550989"/>
-      </p:ext>
-    </p:extLst>
-  </p:cSld>
-  <p:clrMapOvr>
-    <a:masterClrMapping/>
-  </p:clrMapOvr>
-  <mc:AlternateContent xmlns:mc="http://schemas.openxmlformats.org/markup-compatibility/2006" xmlns:p14="http://schemas.microsoft.com/office/powerpoint/2010/main">
-    <mc:Choice Requires="p14">
-      <p:transition p14:dur="0"/>
-    </mc:Choice>
-    <mc:Fallback xmlns="">
-      <p:transition xmlns:p14="http://schemas.microsoft.com/office/powerpoint/2010/main"/>
-    </mc:Fallback>
-  </mc:AlternateContent>
-</p:sld>
-</file>
-
-<file path=ppt/slides/slide8.xml><?xml version="1.0" encoding="utf-8"?>
+<file path=ppt/slides/slide10.xml><?xml version="1.0" encoding="utf-8"?>
 <p:sld xmlns:a="http://schemas.openxmlformats.org/drawingml/2006/main" xmlns:r="http://schemas.openxmlformats.org/officeDocument/2006/relationships" xmlns:p="http://schemas.openxmlformats.org/presentationml/2006/main">
   <p:cSld>
     <p:spTree>
@@ -13009,6 +12246,1711 @@
 </p:sld>
 </file>
 
+<file path=ppt/slides/slide11.xml><?xml version="1.0" encoding="utf-8"?>
+<p:sld xmlns:a="http://schemas.openxmlformats.org/drawingml/2006/main" xmlns:r="http://schemas.openxmlformats.org/officeDocument/2006/relationships" xmlns:p="http://schemas.openxmlformats.org/presentationml/2006/main">
+  <p:cSld>
+    <p:spTree>
+      <p:nvGrpSpPr>
+        <p:cNvPr id="1" name=""/>
+        <p:cNvGrpSpPr/>
+        <p:nvPr/>
+      </p:nvGrpSpPr>
+      <p:grpSpPr>
+        <a:xfrm>
+          <a:off x="0" y="0"/>
+          <a:ext cx="0" cy="0"/>
+          <a:chOff x="0" y="0"/>
+          <a:chExt cx="0" cy="0"/>
+        </a:xfrm>
+      </p:grpSpPr>
+      <p:sp>
+        <p:nvSpPr>
+          <p:cNvPr id="2" name="Title 1"/>
+          <p:cNvSpPr>
+            <a:spLocks noGrp="1"/>
+          </p:cNvSpPr>
+          <p:nvPr>
+            <p:ph type="title"/>
+          </p:nvPr>
+        </p:nvSpPr>
+        <p:spPr/>
+        <p:txBody>
+          <a:bodyPr/>
+          <a:lstStyle/>
+          <a:p>
+            <a:r>
+              <a:rPr lang="en-US" dirty="0" smtClean="0"/>
+              <a:t>How can </a:t>
+            </a:r>
+            <a:r>
+              <a:rPr lang="en-US" dirty="0" err="1" smtClean="0"/>
+              <a:t>Logstash</a:t>
+            </a:r>
+            <a:r>
+              <a:rPr lang="en-US" dirty="0" smtClean="0"/>
+              <a:t> output data</a:t>
+            </a:r>
+            <a:endParaRPr lang="en-US" dirty="0"/>
+          </a:p>
+        </p:txBody>
+      </p:sp>
+      <p:sp>
+        <p:nvSpPr>
+          <p:cNvPr id="3" name="Vertical Text Placeholder 2"/>
+          <p:cNvSpPr>
+            <a:spLocks noGrp="1"/>
+          </p:cNvSpPr>
+          <p:nvPr>
+            <p:ph type="body" orient="vert" idx="1"/>
+          </p:nvPr>
+        </p:nvSpPr>
+        <p:spPr/>
+        <p:txBody>
+          <a:bodyPr/>
+          <a:lstStyle/>
+          <a:p>
+            <a:r>
+              <a:rPr lang="en-US" dirty="0" smtClean="0"/>
+              <a:t>TCP/UDP</a:t>
+            </a:r>
+          </a:p>
+          <a:p>
+            <a:r>
+              <a:rPr lang="en-US" dirty="0" smtClean="0"/>
+              <a:t>Email</a:t>
+            </a:r>
+          </a:p>
+          <a:p>
+            <a:r>
+              <a:rPr lang="en-US" dirty="0" smtClean="0"/>
+              <a:t>Files</a:t>
+            </a:r>
+          </a:p>
+          <a:p>
+            <a:r>
+              <a:rPr lang="en-US" dirty="0" smtClean="0"/>
+              <a:t>HTTP</a:t>
+            </a:r>
+          </a:p>
+          <a:p>
+            <a:r>
+              <a:rPr lang="en-US" dirty="0" err="1" smtClean="0"/>
+              <a:t>Nagios</a:t>
+            </a:r>
+            <a:r>
+              <a:rPr lang="en-US" dirty="0" smtClean="0"/>
+              <a:t> (IT Infrastructure Monitoring tool)</a:t>
+            </a:r>
+          </a:p>
+          <a:p>
+            <a:r>
+              <a:rPr lang="en-US" dirty="0" smtClean="0"/>
+              <a:t>Alerting tools (</a:t>
+            </a:r>
+            <a:r>
+              <a:rPr lang="en-US" dirty="0" err="1" smtClean="0"/>
+              <a:t>Hipchat</a:t>
+            </a:r>
+            <a:r>
+              <a:rPr lang="en-US" dirty="0" smtClean="0"/>
+              <a:t>, SMS)</a:t>
+            </a:r>
+            <a:endParaRPr lang="en-US" dirty="0" smtClean="0"/>
+          </a:p>
+          <a:p>
+            <a:r>
+              <a:rPr lang="en-US" dirty="0" smtClean="0"/>
+              <a:t>Graphing suites (</a:t>
+            </a:r>
+            <a:r>
+              <a:rPr lang="en-US" dirty="0" err="1" smtClean="0"/>
+              <a:t>StatsD</a:t>
+            </a:r>
+            <a:r>
+              <a:rPr lang="en-US" dirty="0" smtClean="0"/>
+              <a:t>, Graphite)</a:t>
+            </a:r>
+          </a:p>
+          <a:p>
+            <a:endParaRPr lang="en-US" dirty="0"/>
+          </a:p>
+        </p:txBody>
+      </p:sp>
+    </p:spTree>
+    <p:extLst>
+      <p:ext uri="{BB962C8B-B14F-4D97-AF65-F5344CB8AC3E}">
+        <p14:creationId xmlns:p14="http://schemas.microsoft.com/office/powerpoint/2010/main" val="1664774299"/>
+      </p:ext>
+    </p:extLst>
+  </p:cSld>
+  <p:clrMapOvr>
+    <a:masterClrMapping/>
+  </p:clrMapOvr>
+  <mc:AlternateContent xmlns:mc="http://schemas.openxmlformats.org/markup-compatibility/2006" xmlns:p14="http://schemas.microsoft.com/office/powerpoint/2010/main">
+    <mc:Choice Requires="p14">
+      <p:transition p14:dur="0"/>
+    </mc:Choice>
+    <mc:Fallback xmlns="">
+      <p:transition xmlns:p14="http://schemas.microsoft.com/office/powerpoint/2010/main"/>
+    </mc:Fallback>
+  </mc:AlternateContent>
+  <p:timing>
+    <p:tnLst>
+      <p:par>
+        <p:cTn xmlns:p14="http://schemas.microsoft.com/office/powerpoint/2010/main" id="1" dur="indefinite" restart="never" nodeType="tmRoot"/>
+      </p:par>
+    </p:tnLst>
+  </p:timing>
+</p:sld>
+</file>
+
+<file path=ppt/slides/slide12.xml><?xml version="1.0" encoding="utf-8"?>
+<p:sld xmlns:a="http://schemas.openxmlformats.org/drawingml/2006/main" xmlns:r="http://schemas.openxmlformats.org/officeDocument/2006/relationships" xmlns:p="http://schemas.openxmlformats.org/presentationml/2006/main">
+  <p:cSld>
+    <p:spTree>
+      <p:nvGrpSpPr>
+        <p:cNvPr id="1" name=""/>
+        <p:cNvGrpSpPr/>
+        <p:nvPr/>
+      </p:nvGrpSpPr>
+      <p:grpSpPr>
+        <a:xfrm>
+          <a:off x="0" y="0"/>
+          <a:ext cx="0" cy="0"/>
+          <a:chOff x="0" y="0"/>
+          <a:chExt cx="0" cy="0"/>
+        </a:xfrm>
+      </p:grpSpPr>
+      <p:sp>
+        <p:nvSpPr>
+          <p:cNvPr id="2" name="Title 1"/>
+          <p:cNvSpPr>
+            <a:spLocks noGrp="1"/>
+          </p:cNvSpPr>
+          <p:nvPr>
+            <p:ph type="title"/>
+          </p:nvPr>
+        </p:nvSpPr>
+        <p:spPr/>
+        <p:txBody>
+          <a:bodyPr/>
+          <a:lstStyle/>
+          <a:p>
+            <a:r>
+              <a:rPr lang="en-US" dirty="0" err="1" smtClean="0"/>
+              <a:t>Logstash</a:t>
+            </a:r>
+            <a:r>
+              <a:rPr lang="en-US" dirty="0" smtClean="0"/>
+              <a:t> @ </a:t>
+            </a:r>
+            <a:r>
+              <a:rPr lang="en-US" dirty="0" err="1" smtClean="0"/>
+              <a:t>Dreamhost</a:t>
+            </a:r>
+            <a:endParaRPr lang="en-US" dirty="0"/>
+          </a:p>
+        </p:txBody>
+      </p:sp>
+      <p:sp>
+        <p:nvSpPr>
+          <p:cNvPr id="3" name="Vertical Text Placeholder 2"/>
+          <p:cNvSpPr>
+            <a:spLocks noGrp="1"/>
+          </p:cNvSpPr>
+          <p:nvPr>
+            <p:ph type="body" orient="vert" idx="1"/>
+          </p:nvPr>
+        </p:nvSpPr>
+        <p:spPr/>
+        <p:txBody>
+          <a:bodyPr/>
+          <a:lstStyle/>
+          <a:p>
+            <a:r>
+              <a:rPr lang="en-US" dirty="0" smtClean="0"/>
+              <a:t>20k apache events/sec peak</a:t>
+            </a:r>
+          </a:p>
+          <a:p>
+            <a:r>
+              <a:rPr lang="en-US" dirty="0" smtClean="0"/>
+              <a:t>250 million events/day</a:t>
+            </a:r>
+          </a:p>
+          <a:p>
+            <a:r>
+              <a:rPr lang="en-US" dirty="0" smtClean="0"/>
+              <a:t>75gb data/day</a:t>
+            </a:r>
+          </a:p>
+          <a:p>
+            <a:r>
+              <a:rPr lang="en-US" dirty="0" smtClean="0"/>
+              <a:t>160 web servers</a:t>
+            </a:r>
+          </a:p>
+          <a:p>
+            <a:r>
+              <a:rPr lang="en-US" dirty="0" smtClean="0"/>
+              <a:t>7 </a:t>
+            </a:r>
+            <a:r>
+              <a:rPr lang="en-US" dirty="0" err="1" smtClean="0"/>
+              <a:t>logstash</a:t>
+            </a:r>
+            <a:r>
+              <a:rPr lang="en-US" dirty="0" smtClean="0"/>
+              <a:t>/</a:t>
+            </a:r>
+            <a:r>
+              <a:rPr lang="en-US" dirty="0" err="1" smtClean="0"/>
+              <a:t>elasticsearch</a:t>
+            </a:r>
+            <a:r>
+              <a:rPr lang="en-US" dirty="0" smtClean="0"/>
+              <a:t> servers</a:t>
+            </a:r>
+            <a:endParaRPr lang="en-US" dirty="0"/>
+          </a:p>
+        </p:txBody>
+      </p:sp>
+    </p:spTree>
+    <p:extLst>
+      <p:ext uri="{BB962C8B-B14F-4D97-AF65-F5344CB8AC3E}">
+        <p14:creationId xmlns:p14="http://schemas.microsoft.com/office/powerpoint/2010/main" val="2370602585"/>
+      </p:ext>
+    </p:extLst>
+  </p:cSld>
+  <p:clrMapOvr>
+    <a:masterClrMapping/>
+  </p:clrMapOvr>
+  <mc:AlternateContent xmlns:mc="http://schemas.openxmlformats.org/markup-compatibility/2006" xmlns:p14="http://schemas.microsoft.com/office/powerpoint/2010/main">
+    <mc:Choice Requires="p14">
+      <p:transition p14:dur="0"/>
+    </mc:Choice>
+    <mc:Fallback xmlns="">
+      <p:transition xmlns:p14="http://schemas.microsoft.com/office/powerpoint/2010/main"/>
+    </mc:Fallback>
+  </mc:AlternateContent>
+  <p:timing>
+    <p:tnLst>
+      <p:par>
+        <p:cTn xmlns:p14="http://schemas.microsoft.com/office/powerpoint/2010/main" id="1" dur="indefinite" restart="never" nodeType="tmRoot">
+          <p:childTnLst>
+            <p:seq concurrent="1" nextAc="seek">
+              <p:cTn id="2" dur="indefinite" nodeType="mainSeq">
+                <p:childTnLst>
+                  <p:par>
+                    <p:cTn id="3" fill="hold">
+                      <p:stCondLst>
+                        <p:cond delay="indefinite"/>
+                      </p:stCondLst>
+                      <p:childTnLst>
+                        <p:par>
+                          <p:cTn id="4" fill="hold">
+                            <p:stCondLst>
+                              <p:cond delay="0"/>
+                            </p:stCondLst>
+                            <p:childTnLst>
+                              <p:par>
+                                <p:cTn id="5" presetID="1" presetClass="entr" presetSubtype="0" fill="hold" grpId="0" nodeType="clickEffect">
+                                  <p:stCondLst>
+                                    <p:cond delay="0"/>
+                                  </p:stCondLst>
+                                  <p:childTnLst>
+                                    <p:set>
+                                      <p:cBhvr>
+                                        <p:cTn id="6" dur="1" fill="hold">
+                                          <p:stCondLst>
+                                            <p:cond delay="0"/>
+                                          </p:stCondLst>
+                                        </p:cTn>
+                                        <p:tgtEl>
+                                          <p:spTgt spid="3">
+                                            <p:txEl>
+                                              <p:pRg st="0" end="0"/>
+                                            </p:txEl>
+                                          </p:spTgt>
+                                        </p:tgtEl>
+                                        <p:attrNameLst>
+                                          <p:attrName>style.visibility</p:attrName>
+                                        </p:attrNameLst>
+                                      </p:cBhvr>
+                                      <p:to>
+                                        <p:strVal val="visible"/>
+                                      </p:to>
+                                    </p:set>
+                                  </p:childTnLst>
+                                </p:cTn>
+                              </p:par>
+                            </p:childTnLst>
+                          </p:cTn>
+                        </p:par>
+                      </p:childTnLst>
+                    </p:cTn>
+                  </p:par>
+                  <p:par>
+                    <p:cTn id="7" fill="hold">
+                      <p:stCondLst>
+                        <p:cond delay="indefinite"/>
+                      </p:stCondLst>
+                      <p:childTnLst>
+                        <p:par>
+                          <p:cTn id="8" fill="hold">
+                            <p:stCondLst>
+                              <p:cond delay="0"/>
+                            </p:stCondLst>
+                            <p:childTnLst>
+                              <p:par>
+                                <p:cTn id="9" presetID="1" presetClass="entr" presetSubtype="0" fill="hold" grpId="0" nodeType="clickEffect">
+                                  <p:stCondLst>
+                                    <p:cond delay="0"/>
+                                  </p:stCondLst>
+                                  <p:childTnLst>
+                                    <p:set>
+                                      <p:cBhvr>
+                                        <p:cTn id="10" dur="1" fill="hold">
+                                          <p:stCondLst>
+                                            <p:cond delay="0"/>
+                                          </p:stCondLst>
+                                        </p:cTn>
+                                        <p:tgtEl>
+                                          <p:spTgt spid="3">
+                                            <p:txEl>
+                                              <p:pRg st="1" end="1"/>
+                                            </p:txEl>
+                                          </p:spTgt>
+                                        </p:tgtEl>
+                                        <p:attrNameLst>
+                                          <p:attrName>style.visibility</p:attrName>
+                                        </p:attrNameLst>
+                                      </p:cBhvr>
+                                      <p:to>
+                                        <p:strVal val="visible"/>
+                                      </p:to>
+                                    </p:set>
+                                  </p:childTnLst>
+                                </p:cTn>
+                              </p:par>
+                            </p:childTnLst>
+                          </p:cTn>
+                        </p:par>
+                      </p:childTnLst>
+                    </p:cTn>
+                  </p:par>
+                  <p:par>
+                    <p:cTn id="11" fill="hold">
+                      <p:stCondLst>
+                        <p:cond delay="indefinite"/>
+                      </p:stCondLst>
+                      <p:childTnLst>
+                        <p:par>
+                          <p:cTn id="12" fill="hold">
+                            <p:stCondLst>
+                              <p:cond delay="0"/>
+                            </p:stCondLst>
+                            <p:childTnLst>
+                              <p:par>
+                                <p:cTn id="13" presetID="1" presetClass="entr" presetSubtype="0" fill="hold" grpId="0" nodeType="clickEffect">
+                                  <p:stCondLst>
+                                    <p:cond delay="0"/>
+                                  </p:stCondLst>
+                                  <p:childTnLst>
+                                    <p:set>
+                                      <p:cBhvr>
+                                        <p:cTn id="14" dur="1" fill="hold">
+                                          <p:stCondLst>
+                                            <p:cond delay="0"/>
+                                          </p:stCondLst>
+                                        </p:cTn>
+                                        <p:tgtEl>
+                                          <p:spTgt spid="3">
+                                            <p:txEl>
+                                              <p:pRg st="2" end="2"/>
+                                            </p:txEl>
+                                          </p:spTgt>
+                                        </p:tgtEl>
+                                        <p:attrNameLst>
+                                          <p:attrName>style.visibility</p:attrName>
+                                        </p:attrNameLst>
+                                      </p:cBhvr>
+                                      <p:to>
+                                        <p:strVal val="visible"/>
+                                      </p:to>
+                                    </p:set>
+                                  </p:childTnLst>
+                                </p:cTn>
+                              </p:par>
+                            </p:childTnLst>
+                          </p:cTn>
+                        </p:par>
+                      </p:childTnLst>
+                    </p:cTn>
+                  </p:par>
+                  <p:par>
+                    <p:cTn id="15" fill="hold">
+                      <p:stCondLst>
+                        <p:cond delay="indefinite"/>
+                      </p:stCondLst>
+                      <p:childTnLst>
+                        <p:par>
+                          <p:cTn id="16" fill="hold">
+                            <p:stCondLst>
+                              <p:cond delay="0"/>
+                            </p:stCondLst>
+                            <p:childTnLst>
+                              <p:par>
+                                <p:cTn id="17" presetID="1" presetClass="entr" presetSubtype="0" fill="hold" grpId="0" nodeType="clickEffect">
+                                  <p:stCondLst>
+                                    <p:cond delay="0"/>
+                                  </p:stCondLst>
+                                  <p:childTnLst>
+                                    <p:set>
+                                      <p:cBhvr>
+                                        <p:cTn id="18" dur="1" fill="hold">
+                                          <p:stCondLst>
+                                            <p:cond delay="0"/>
+                                          </p:stCondLst>
+                                        </p:cTn>
+                                        <p:tgtEl>
+                                          <p:spTgt spid="3">
+                                            <p:txEl>
+                                              <p:pRg st="3" end="3"/>
+                                            </p:txEl>
+                                          </p:spTgt>
+                                        </p:tgtEl>
+                                        <p:attrNameLst>
+                                          <p:attrName>style.visibility</p:attrName>
+                                        </p:attrNameLst>
+                                      </p:cBhvr>
+                                      <p:to>
+                                        <p:strVal val="visible"/>
+                                      </p:to>
+                                    </p:set>
+                                  </p:childTnLst>
+                                </p:cTn>
+                              </p:par>
+                            </p:childTnLst>
+                          </p:cTn>
+                        </p:par>
+                      </p:childTnLst>
+                    </p:cTn>
+                  </p:par>
+                  <p:par>
+                    <p:cTn id="19" fill="hold">
+                      <p:stCondLst>
+                        <p:cond delay="indefinite"/>
+                      </p:stCondLst>
+                      <p:childTnLst>
+                        <p:par>
+                          <p:cTn id="20" fill="hold">
+                            <p:stCondLst>
+                              <p:cond delay="0"/>
+                            </p:stCondLst>
+                            <p:childTnLst>
+                              <p:par>
+                                <p:cTn id="21" presetID="1" presetClass="entr" presetSubtype="0" fill="hold" grpId="0" nodeType="clickEffect">
+                                  <p:stCondLst>
+                                    <p:cond delay="0"/>
+                                  </p:stCondLst>
+                                  <p:childTnLst>
+                                    <p:set>
+                                      <p:cBhvr>
+                                        <p:cTn id="22" dur="1" fill="hold">
+                                          <p:stCondLst>
+                                            <p:cond delay="0"/>
+                                          </p:stCondLst>
+                                        </p:cTn>
+                                        <p:tgtEl>
+                                          <p:spTgt spid="3">
+                                            <p:txEl>
+                                              <p:pRg st="4" end="4"/>
+                                            </p:txEl>
+                                          </p:spTgt>
+                                        </p:tgtEl>
+                                        <p:attrNameLst>
+                                          <p:attrName>style.visibility</p:attrName>
+                                        </p:attrNameLst>
+                                      </p:cBhvr>
+                                      <p:to>
+                                        <p:strVal val="visible"/>
+                                      </p:to>
+                                    </p:set>
+                                  </p:childTnLst>
+                                </p:cTn>
+                              </p:par>
+                            </p:childTnLst>
+                          </p:cTn>
+                        </p:par>
+                      </p:childTnLst>
+                    </p:cTn>
+                  </p:par>
+                </p:childTnLst>
+              </p:cTn>
+              <p:prevCondLst>
+                <p:cond evt="onPrev" delay="0">
+                  <p:tgtEl>
+                    <p:sldTgt/>
+                  </p:tgtEl>
+                </p:cond>
+              </p:prevCondLst>
+              <p:nextCondLst>
+                <p:cond evt="onNext" delay="0">
+                  <p:tgtEl>
+                    <p:sldTgt/>
+                  </p:tgtEl>
+                </p:cond>
+              </p:nextCondLst>
+            </p:seq>
+          </p:childTnLst>
+        </p:cTn>
+      </p:par>
+    </p:tnLst>
+    <p:bldLst>
+      <p:bldP spid="3" grpId="0" build="p"/>
+    </p:bldLst>
+  </p:timing>
+</p:sld>
+</file>
+
+<file path=ppt/slides/slide13.xml><?xml version="1.0" encoding="utf-8"?>
+<p:sld xmlns:a="http://schemas.openxmlformats.org/drawingml/2006/main" xmlns:r="http://schemas.openxmlformats.org/officeDocument/2006/relationships" xmlns:p="http://schemas.openxmlformats.org/presentationml/2006/main">
+  <p:cSld>
+    <p:spTree>
+      <p:nvGrpSpPr>
+        <p:cNvPr id="1" name=""/>
+        <p:cNvGrpSpPr/>
+        <p:nvPr/>
+      </p:nvGrpSpPr>
+      <p:grpSpPr>
+        <a:xfrm>
+          <a:off x="0" y="0"/>
+          <a:ext cx="0" cy="0"/>
+          <a:chOff x="0" y="0"/>
+          <a:chExt cx="0" cy="0"/>
+        </a:xfrm>
+      </p:grpSpPr>
+      <p:pic>
+        <p:nvPicPr>
+          <p:cNvPr id="3" name="Picture 2" descr="Kibana_3.png"/>
+          <p:cNvPicPr>
+            <a:picLocks noChangeAspect="1"/>
+          </p:cNvPicPr>
+          <p:nvPr/>
+        </p:nvPicPr>
+        <p:blipFill>
+          <a:blip r:embed="rId2">
+            <a:extLst>
+              <a:ext uri="{28A0092B-C50C-407E-A947-70E740481C1C}">
+                <a14:useLocalDpi xmlns:a14="http://schemas.microsoft.com/office/drawing/2010/main" val="0"/>
+              </a:ext>
+            </a:extLst>
+          </a:blip>
+          <a:stretch>
+            <a:fillRect/>
+          </a:stretch>
+        </p:blipFill>
+        <p:spPr>
+          <a:xfrm>
+            <a:off x="0" y="0"/>
+            <a:ext cx="9144000" cy="5274129"/>
+          </a:xfrm>
+          <a:prstGeom prst="rect">
+            <a:avLst/>
+          </a:prstGeom>
+        </p:spPr>
+      </p:pic>
+    </p:spTree>
+    <p:extLst>
+      <p:ext uri="{BB962C8B-B14F-4D97-AF65-F5344CB8AC3E}">
+        <p14:creationId xmlns:p14="http://schemas.microsoft.com/office/powerpoint/2010/main" val="3597678979"/>
+      </p:ext>
+    </p:extLst>
+  </p:cSld>
+  <p:clrMapOvr>
+    <a:masterClrMapping/>
+  </p:clrMapOvr>
+  <mc:AlternateContent xmlns:mc="http://schemas.openxmlformats.org/markup-compatibility/2006" xmlns:p14="http://schemas.microsoft.com/office/powerpoint/2010/main">
+    <mc:Choice Requires="p14">
+      <p:transition p14:dur="0"/>
+    </mc:Choice>
+    <mc:Fallback xmlns="">
+      <p:transition xmlns:p14="http://schemas.microsoft.com/office/powerpoint/2010/main"/>
+    </mc:Fallback>
+  </mc:AlternateContent>
+</p:sld>
+</file>
+
+<file path=ppt/slides/slide14.xml><?xml version="1.0" encoding="utf-8"?>
+<p:sld xmlns:a="http://schemas.openxmlformats.org/drawingml/2006/main" xmlns:r="http://schemas.openxmlformats.org/officeDocument/2006/relationships" xmlns:p="http://schemas.openxmlformats.org/presentationml/2006/main">
+  <p:cSld>
+    <p:spTree>
+      <p:nvGrpSpPr>
+        <p:cNvPr id="1" name=""/>
+        <p:cNvGrpSpPr/>
+        <p:nvPr/>
+      </p:nvGrpSpPr>
+      <p:grpSpPr>
+        <a:xfrm>
+          <a:off x="0" y="0"/>
+          <a:ext cx="0" cy="0"/>
+          <a:chOff x="0" y="0"/>
+          <a:chExt cx="0" cy="0"/>
+        </a:xfrm>
+      </p:grpSpPr>
+      <p:sp>
+        <p:nvSpPr>
+          <p:cNvPr id="2" name="Title 1"/>
+          <p:cNvSpPr>
+            <a:spLocks noGrp="1"/>
+          </p:cNvSpPr>
+          <p:nvPr>
+            <p:ph type="title"/>
+          </p:nvPr>
+        </p:nvSpPr>
+        <p:spPr/>
+        <p:txBody>
+          <a:bodyPr/>
+          <a:lstStyle/>
+          <a:p>
+            <a:r>
+              <a:rPr lang="en-US" dirty="0" smtClean="0"/>
+              <a:t>Resources</a:t>
+            </a:r>
+            <a:endParaRPr lang="en-US" dirty="0"/>
+          </a:p>
+        </p:txBody>
+      </p:sp>
+      <p:sp>
+        <p:nvSpPr>
+          <p:cNvPr id="3" name="Vertical Text Placeholder 2"/>
+          <p:cNvSpPr>
+            <a:spLocks noGrp="1"/>
+          </p:cNvSpPr>
+          <p:nvPr>
+            <p:ph type="body" orient="vert" idx="1"/>
+          </p:nvPr>
+        </p:nvSpPr>
+        <p:spPr/>
+        <p:txBody>
+          <a:bodyPr/>
+          <a:lstStyle/>
+          <a:p>
+            <a:r>
+              <a:rPr lang="en-US" dirty="0" smtClean="0">
+                <a:hlinkClick r:id="rId2"/>
+              </a:rPr>
+              <a:t>http://logstash.net</a:t>
+            </a:r>
+            <a:endParaRPr lang="en-US" dirty="0" smtClean="0"/>
+          </a:p>
+          <a:p>
+            <a:r>
+              <a:rPr lang="en-US" dirty="0" smtClean="0">
+                <a:hlinkClick r:id="rId3"/>
+              </a:rPr>
+              <a:t>http://www.logstashbook.com</a:t>
+            </a:r>
+            <a:r>
+              <a:rPr lang="en-US" dirty="0" smtClean="0"/>
+              <a:t> ($9.99)</a:t>
+            </a:r>
+          </a:p>
+          <a:p>
+            <a:r>
+              <a:rPr lang="en-US" dirty="0" smtClean="0">
+                <a:hlinkClick r:id="rId4"/>
+              </a:rPr>
+              <a:t>http://github.com/logstash</a:t>
+            </a:r>
+            <a:endParaRPr lang="en-US" dirty="0" smtClean="0"/>
+          </a:p>
+          <a:p>
+            <a:r>
+              <a:rPr lang="en-US" dirty="0" smtClean="0">
+                <a:hlinkClick r:id="rId5"/>
+              </a:rPr>
+              <a:t>logstash-users@googlegroups.com</a:t>
+            </a:r>
+            <a:endParaRPr lang="en-US" dirty="0" smtClean="0"/>
+          </a:p>
+          <a:p>
+            <a:r>
+              <a:rPr lang="en-US" dirty="0" err="1" smtClean="0"/>
+              <a:t>logstash.jira.com</a:t>
+            </a:r>
+            <a:endParaRPr lang="en-US" dirty="0" smtClean="0"/>
+          </a:p>
+          <a:p>
+            <a:r>
+              <a:rPr lang="en-US" dirty="0" smtClean="0"/>
+              <a:t>Google</a:t>
+            </a:r>
+          </a:p>
+        </p:txBody>
+      </p:sp>
+    </p:spTree>
+    <p:extLst>
+      <p:ext uri="{BB962C8B-B14F-4D97-AF65-F5344CB8AC3E}">
+        <p14:creationId xmlns:p14="http://schemas.microsoft.com/office/powerpoint/2010/main" val="1739427486"/>
+      </p:ext>
+    </p:extLst>
+  </p:cSld>
+  <p:clrMapOvr>
+    <a:masterClrMapping/>
+  </p:clrMapOvr>
+  <mc:AlternateContent xmlns:mc="http://schemas.openxmlformats.org/markup-compatibility/2006" xmlns:p14="http://schemas.microsoft.com/office/powerpoint/2010/main">
+    <mc:Choice Requires="p14">
+      <p:transition p14:dur="0"/>
+    </mc:Choice>
+    <mc:Fallback xmlns="">
+      <p:transition xmlns:p14="http://schemas.microsoft.com/office/powerpoint/2010/main"/>
+    </mc:Fallback>
+  </mc:AlternateContent>
+  <p:timing>
+    <p:tnLst>
+      <p:par>
+        <p:cTn xmlns:p14="http://schemas.microsoft.com/office/powerpoint/2010/main" id="1" dur="indefinite" restart="never" nodeType="tmRoot"/>
+      </p:par>
+    </p:tnLst>
+  </p:timing>
+</p:sld>
+</file>
+
+<file path=ppt/slides/slide2.xml><?xml version="1.0" encoding="utf-8"?>
+<p:sld xmlns:a="http://schemas.openxmlformats.org/drawingml/2006/main" xmlns:r="http://schemas.openxmlformats.org/officeDocument/2006/relationships" xmlns:p="http://schemas.openxmlformats.org/presentationml/2006/main">
+  <p:cSld>
+    <p:spTree>
+      <p:nvGrpSpPr>
+        <p:cNvPr id="1" name=""/>
+        <p:cNvGrpSpPr/>
+        <p:nvPr/>
+      </p:nvGrpSpPr>
+      <p:grpSpPr>
+        <a:xfrm>
+          <a:off x="0" y="0"/>
+          <a:ext cx="0" cy="0"/>
+          <a:chOff x="0" y="0"/>
+          <a:chExt cx="0" cy="0"/>
+        </a:xfrm>
+      </p:grpSpPr>
+      <p:sp>
+        <p:nvSpPr>
+          <p:cNvPr id="2" name="Title 1"/>
+          <p:cNvSpPr>
+            <a:spLocks noGrp="1"/>
+          </p:cNvSpPr>
+          <p:nvPr>
+            <p:ph type="title"/>
+          </p:nvPr>
+        </p:nvSpPr>
+        <p:spPr/>
+        <p:txBody>
+          <a:bodyPr/>
+          <a:lstStyle/>
+          <a:p>
+            <a:pPr algn="ctr"/>
+            <a:r>
+              <a:rPr lang="en-US" dirty="0" smtClean="0"/>
+              <a:t>Old school logging</a:t>
+            </a:r>
+            <a:endParaRPr lang="en-US" dirty="0"/>
+          </a:p>
+        </p:txBody>
+      </p:sp>
+      <p:sp>
+        <p:nvSpPr>
+          <p:cNvPr id="3" name="Vertical Text Placeholder 2"/>
+          <p:cNvSpPr>
+            <a:spLocks noGrp="1"/>
+          </p:cNvSpPr>
+          <p:nvPr>
+            <p:ph type="body" orient="vert" idx="1"/>
+          </p:nvPr>
+        </p:nvSpPr>
+        <p:spPr/>
+        <p:txBody>
+          <a:bodyPr/>
+          <a:lstStyle/>
+          <a:p>
+            <a:r>
+              <a:rPr lang="en-US" dirty="0" smtClean="0"/>
+              <a:t>When you are told to go look at the logs</a:t>
+            </a:r>
+          </a:p>
+          <a:p>
+            <a:pPr lvl="1"/>
+            <a:r>
+              <a:rPr lang="en-US" dirty="0" smtClean="0"/>
+              <a:t>cat, tail, </a:t>
+            </a:r>
+            <a:r>
+              <a:rPr lang="en-US" dirty="0" err="1" smtClean="0"/>
+              <a:t>grep</a:t>
+            </a:r>
+            <a:r>
+              <a:rPr lang="en-US" dirty="0" smtClean="0"/>
+              <a:t>, </a:t>
+            </a:r>
+            <a:r>
+              <a:rPr lang="en-US" dirty="0" err="1" smtClean="0"/>
+              <a:t>sed</a:t>
+            </a:r>
+            <a:r>
+              <a:rPr lang="en-US" dirty="0" smtClean="0"/>
+              <a:t>, </a:t>
+            </a:r>
+            <a:r>
+              <a:rPr lang="en-US" dirty="0" err="1" smtClean="0"/>
+              <a:t>awk</a:t>
+            </a:r>
+            <a:r>
+              <a:rPr lang="en-US" dirty="0" smtClean="0"/>
+              <a:t>, …..</a:t>
+            </a:r>
+          </a:p>
+          <a:p>
+            <a:pPr lvl="1"/>
+            <a:r>
+              <a:rPr lang="en-US" dirty="0" smtClean="0"/>
+              <a:t>regular expressions</a:t>
+            </a:r>
+          </a:p>
+          <a:p>
+            <a:pPr lvl="1"/>
+            <a:endParaRPr lang="en-US" dirty="0" smtClean="0"/>
+          </a:p>
+        </p:txBody>
+      </p:sp>
+    </p:spTree>
+    <p:extLst>
+      <p:ext uri="{BB962C8B-B14F-4D97-AF65-F5344CB8AC3E}">
+        <p14:creationId xmlns:p14="http://schemas.microsoft.com/office/powerpoint/2010/main" val="3100135462"/>
+      </p:ext>
+    </p:extLst>
+  </p:cSld>
+  <p:clrMapOvr>
+    <a:masterClrMapping/>
+  </p:clrMapOvr>
+  <mc:AlternateContent xmlns:mc="http://schemas.openxmlformats.org/markup-compatibility/2006" xmlns:p14="http://schemas.microsoft.com/office/powerpoint/2010/main">
+    <mc:Choice Requires="p14">
+      <p:transition p14:dur="0"/>
+    </mc:Choice>
+    <mc:Fallback xmlns="">
+      <p:transition xmlns:p14="http://schemas.microsoft.com/office/powerpoint/2010/main"/>
+    </mc:Fallback>
+  </mc:AlternateContent>
+</p:sld>
+</file>
+
+<file path=ppt/slides/slide3.xml><?xml version="1.0" encoding="utf-8"?>
+<p:sld xmlns:a="http://schemas.openxmlformats.org/drawingml/2006/main" xmlns:r="http://schemas.openxmlformats.org/officeDocument/2006/relationships" xmlns:p="http://schemas.openxmlformats.org/presentationml/2006/main">
+  <p:cSld>
+    <p:spTree>
+      <p:nvGrpSpPr>
+        <p:cNvPr id="1" name=""/>
+        <p:cNvGrpSpPr/>
+        <p:nvPr/>
+      </p:nvGrpSpPr>
+      <p:grpSpPr>
+        <a:xfrm>
+          <a:off x="0" y="0"/>
+          <a:ext cx="0" cy="0"/>
+          <a:chOff x="0" y="0"/>
+          <a:chExt cx="0" cy="0"/>
+        </a:xfrm>
+      </p:grpSpPr>
+      <p:sp>
+        <p:nvSpPr>
+          <p:cNvPr id="2" name="Title 1"/>
+          <p:cNvSpPr>
+            <a:spLocks noGrp="1"/>
+          </p:cNvSpPr>
+          <p:nvPr>
+            <p:ph type="title"/>
+          </p:nvPr>
+        </p:nvSpPr>
+        <p:spPr/>
+        <p:txBody>
+          <a:bodyPr/>
+          <a:lstStyle/>
+          <a:p>
+            <a:r>
+              <a:rPr lang="en-US" dirty="0" smtClean="0"/>
+              <a:t>What time is it?</a:t>
+            </a:r>
+            <a:endParaRPr lang="en-US" dirty="0"/>
+          </a:p>
+        </p:txBody>
+      </p:sp>
+      <p:sp>
+        <p:nvSpPr>
+          <p:cNvPr id="3" name="Vertical Text Placeholder 2"/>
+          <p:cNvSpPr>
+            <a:spLocks noGrp="1"/>
+          </p:cNvSpPr>
+          <p:nvPr>
+            <p:ph type="body" orient="vert" idx="1"/>
+          </p:nvPr>
+        </p:nvSpPr>
+        <p:spPr/>
+        <p:txBody>
+          <a:bodyPr/>
+          <a:lstStyle/>
+          <a:p>
+            <a:r>
+              <a:rPr lang="en-US" dirty="0" smtClean="0"/>
+              <a:t>1304060505</a:t>
+            </a:r>
+          </a:p>
+          <a:p>
+            <a:r>
+              <a:rPr lang="en-US" dirty="0" smtClean="0"/>
+              <a:t>29/Apr/2011:07:05:26 +0000</a:t>
+            </a:r>
+          </a:p>
+          <a:p>
+            <a:r>
+              <a:rPr lang="en-US" dirty="0" smtClean="0"/>
+              <a:t>Fri, 21 Nov 1997 09:55:06 -0600</a:t>
+            </a:r>
+          </a:p>
+          <a:p>
+            <a:r>
+              <a:rPr lang="en-US" dirty="0" smtClean="0"/>
+              <a:t>Oct 11 20:21:47</a:t>
+            </a:r>
+          </a:p>
+          <a:p>
+            <a:r>
+              <a:rPr lang="en-US" dirty="0" smtClean="0"/>
+              <a:t>020805 13:51:24</a:t>
+            </a:r>
+          </a:p>
+          <a:p>
+            <a:r>
+              <a:rPr lang="en-US" dirty="0" smtClean="0"/>
+              <a:t>110429.071055,118</a:t>
+            </a:r>
+          </a:p>
+          <a:p>
+            <a:r>
+              <a:rPr lang="en-US" dirty="0" smtClean="0"/>
+              <a:t>@4000000037c219bf2ef02e94</a:t>
+            </a:r>
+            <a:endParaRPr lang="en-US" dirty="0"/>
+          </a:p>
+        </p:txBody>
+      </p:sp>
+    </p:spTree>
+    <p:extLst>
+      <p:ext uri="{BB962C8B-B14F-4D97-AF65-F5344CB8AC3E}">
+        <p14:creationId xmlns:p14="http://schemas.microsoft.com/office/powerpoint/2010/main" val="2003451829"/>
+      </p:ext>
+    </p:extLst>
+  </p:cSld>
+  <p:clrMapOvr>
+    <a:masterClrMapping/>
+  </p:clrMapOvr>
+  <mc:AlternateContent xmlns:mc="http://schemas.openxmlformats.org/markup-compatibility/2006" xmlns:p14="http://schemas.microsoft.com/office/powerpoint/2010/main">
+    <mc:Choice Requires="p14">
+      <p:transition p14:dur="0"/>
+    </mc:Choice>
+    <mc:Fallback xmlns="">
+      <p:transition xmlns:p14="http://schemas.microsoft.com/office/powerpoint/2010/main"/>
+    </mc:Fallback>
+  </mc:AlternateContent>
+</p:sld>
+</file>
+
+<file path=ppt/slides/slide4.xml><?xml version="1.0" encoding="utf-8"?>
+<p:sld xmlns:a="http://schemas.openxmlformats.org/drawingml/2006/main" xmlns:r="http://schemas.openxmlformats.org/officeDocument/2006/relationships" xmlns:p="http://schemas.openxmlformats.org/presentationml/2006/main">
+  <p:cSld>
+    <p:spTree>
+      <p:nvGrpSpPr>
+        <p:cNvPr id="1" name=""/>
+        <p:cNvGrpSpPr/>
+        <p:nvPr/>
+      </p:nvGrpSpPr>
+      <p:grpSpPr>
+        <a:xfrm>
+          <a:off x="0" y="0"/>
+          <a:ext cx="0" cy="0"/>
+          <a:chOff x="0" y="0"/>
+          <a:chExt cx="0" cy="0"/>
+        </a:xfrm>
+      </p:grpSpPr>
+      <p:sp>
+        <p:nvSpPr>
+          <p:cNvPr id="2" name="Title 1"/>
+          <p:cNvSpPr>
+            <a:spLocks noGrp="1"/>
+          </p:cNvSpPr>
+          <p:nvPr>
+            <p:ph type="title"/>
+          </p:nvPr>
+        </p:nvSpPr>
+        <p:spPr/>
+        <p:txBody>
+          <a:bodyPr/>
+          <a:lstStyle/>
+          <a:p>
+            <a:r>
+              <a:rPr lang="en-US" dirty="0" smtClean="0"/>
+              <a:t>Does not scale</a:t>
+            </a:r>
+            <a:endParaRPr lang="en-US" dirty="0"/>
+          </a:p>
+        </p:txBody>
+      </p:sp>
+      <p:sp>
+        <p:nvSpPr>
+          <p:cNvPr id="3" name="Vertical Text Placeholder 2"/>
+          <p:cNvSpPr>
+            <a:spLocks noGrp="1"/>
+          </p:cNvSpPr>
+          <p:nvPr>
+            <p:ph type="body" orient="vert" idx="1"/>
+          </p:nvPr>
+        </p:nvSpPr>
+        <p:spPr/>
+        <p:txBody>
+          <a:bodyPr/>
+          <a:lstStyle/>
+          <a:p>
+            <a:pPr marL="0" indent="0">
+              <a:buNone/>
+            </a:pPr>
+            <a:endParaRPr lang="en-US" dirty="0"/>
+          </a:p>
+          <a:p>
+            <a:pPr marL="0" indent="0" algn="ctr">
+              <a:buNone/>
+            </a:pPr>
+            <a:r>
+              <a:rPr lang="en-US" dirty="0"/>
+              <a:t>More than one </a:t>
+            </a:r>
+            <a:r>
+              <a:rPr lang="en-US" dirty="0" smtClean="0"/>
+              <a:t>server</a:t>
+            </a:r>
+          </a:p>
+          <a:p>
+            <a:pPr marL="0" indent="0" algn="ctr">
+              <a:buNone/>
+            </a:pPr>
+            <a:endParaRPr lang="en-US" dirty="0"/>
+          </a:p>
+          <a:p>
+            <a:pPr marL="0" indent="0" algn="ctr">
+              <a:buNone/>
+            </a:pPr>
+            <a:r>
+              <a:rPr lang="en-US" dirty="0"/>
+              <a:t>Many sources within any given </a:t>
+            </a:r>
+            <a:r>
+              <a:rPr lang="en-US" dirty="0" smtClean="0"/>
+              <a:t>server</a:t>
+            </a:r>
+          </a:p>
+          <a:p>
+            <a:pPr marL="0" indent="0" algn="ctr">
+              <a:buNone/>
+            </a:pPr>
+            <a:endParaRPr lang="en-US" dirty="0"/>
+          </a:p>
+          <a:p>
+            <a:pPr marL="0" indent="0" algn="ctr">
+              <a:buNone/>
+            </a:pPr>
+            <a:r>
+              <a:rPr lang="en-US" dirty="0"/>
+              <a:t>Different time zones for different servers</a:t>
+            </a:r>
+          </a:p>
+          <a:p>
+            <a:pPr marL="0" indent="0">
+              <a:buNone/>
+            </a:pPr>
+            <a:endParaRPr lang="en-US" dirty="0"/>
+          </a:p>
+        </p:txBody>
+      </p:sp>
+    </p:spTree>
+    <p:extLst>
+      <p:ext uri="{BB962C8B-B14F-4D97-AF65-F5344CB8AC3E}">
+        <p14:creationId xmlns:p14="http://schemas.microsoft.com/office/powerpoint/2010/main" val="3428631922"/>
+      </p:ext>
+    </p:extLst>
+  </p:cSld>
+  <p:clrMapOvr>
+    <a:masterClrMapping/>
+  </p:clrMapOvr>
+  <mc:AlternateContent xmlns:mc="http://schemas.openxmlformats.org/markup-compatibility/2006" xmlns:p14="http://schemas.microsoft.com/office/powerpoint/2010/main">
+    <mc:Choice Requires="p14">
+      <p:transition p14:dur="0"/>
+    </mc:Choice>
+    <mc:Fallback xmlns="">
+      <p:transition xmlns:p14="http://schemas.microsoft.com/office/powerpoint/2010/main"/>
+    </mc:Fallback>
+  </mc:AlternateContent>
+</p:sld>
+</file>
+
+<file path=ppt/slides/slide5.xml><?xml version="1.0" encoding="utf-8"?>
+<p:sld xmlns:a="http://schemas.openxmlformats.org/drawingml/2006/main" xmlns:r="http://schemas.openxmlformats.org/officeDocument/2006/relationships" xmlns:p="http://schemas.openxmlformats.org/presentationml/2006/main">
+  <p:cSld>
+    <p:spTree>
+      <p:nvGrpSpPr>
+        <p:cNvPr id="1" name=""/>
+        <p:cNvGrpSpPr/>
+        <p:nvPr/>
+      </p:nvGrpSpPr>
+      <p:grpSpPr>
+        <a:xfrm>
+          <a:off x="0" y="0"/>
+          <a:ext cx="0" cy="0"/>
+          <a:chOff x="0" y="0"/>
+          <a:chExt cx="0" cy="0"/>
+        </a:xfrm>
+      </p:grpSpPr>
+      <p:sp>
+        <p:nvSpPr>
+          <p:cNvPr id="2" name="Title 1"/>
+          <p:cNvSpPr>
+            <a:spLocks noGrp="1"/>
+          </p:cNvSpPr>
+          <p:nvPr>
+            <p:ph type="title"/>
+          </p:nvPr>
+        </p:nvSpPr>
+        <p:spPr/>
+        <p:txBody>
+          <a:bodyPr/>
+          <a:lstStyle/>
+          <a:p>
+            <a:r>
+              <a:rPr lang="en-US" dirty="0" smtClean="0"/>
+              <a:t>System Logs</a:t>
+            </a:r>
+            <a:endParaRPr lang="en-US" dirty="0"/>
+          </a:p>
+        </p:txBody>
+      </p:sp>
+      <p:sp>
+        <p:nvSpPr>
+          <p:cNvPr id="3" name="Vertical Text Placeholder 2"/>
+          <p:cNvSpPr>
+            <a:spLocks noGrp="1"/>
+          </p:cNvSpPr>
+          <p:nvPr>
+            <p:ph type="body" orient="vert" idx="1"/>
+          </p:nvPr>
+        </p:nvSpPr>
+        <p:spPr/>
+        <p:txBody>
+          <a:bodyPr/>
+          <a:lstStyle/>
+          <a:p>
+            <a:pPr marL="0" indent="0" algn="ctr">
+              <a:buNone/>
+            </a:pPr>
+            <a:endParaRPr lang="en-US" dirty="0" smtClean="0"/>
+          </a:p>
+          <a:p>
+            <a:pPr marL="0" indent="0" algn="ctr">
+              <a:buNone/>
+            </a:pPr>
+            <a:r>
+              <a:rPr lang="en-US" dirty="0" smtClean="0"/>
+              <a:t>Consolidate log entries to single location</a:t>
+            </a:r>
+          </a:p>
+          <a:p>
+            <a:pPr marL="0" indent="0">
+              <a:buNone/>
+            </a:pPr>
+            <a:endParaRPr lang="en-US" dirty="0"/>
+          </a:p>
+          <a:p>
+            <a:pPr marL="0" indent="0" algn="ctr">
+              <a:buNone/>
+            </a:pPr>
+            <a:r>
+              <a:rPr lang="en-US" dirty="0" smtClean="0"/>
+              <a:t>Now, the problem turns from too little information to one of too much information and too little </a:t>
+            </a:r>
+            <a:r>
+              <a:rPr lang="en-US" dirty="0" smtClean="0"/>
+              <a:t>context</a:t>
+            </a:r>
+          </a:p>
+          <a:p>
+            <a:pPr marL="0" indent="0" algn="ctr">
+              <a:buNone/>
+            </a:pPr>
+            <a:endParaRPr lang="en-US" dirty="0"/>
+          </a:p>
+          <a:p>
+            <a:pPr marL="0" indent="0" algn="ctr">
+              <a:buNone/>
+            </a:pPr>
+            <a:r>
+              <a:rPr lang="en-US" dirty="0" smtClean="0"/>
+              <a:t>Not everything logs to the system log</a:t>
+            </a:r>
+            <a:endParaRPr lang="en-US" dirty="0"/>
+          </a:p>
+        </p:txBody>
+      </p:sp>
+    </p:spTree>
+    <p:extLst>
+      <p:ext uri="{BB962C8B-B14F-4D97-AF65-F5344CB8AC3E}">
+        <p14:creationId xmlns:p14="http://schemas.microsoft.com/office/powerpoint/2010/main" val="706661088"/>
+      </p:ext>
+    </p:extLst>
+  </p:cSld>
+  <p:clrMapOvr>
+    <a:masterClrMapping/>
+  </p:clrMapOvr>
+  <mc:AlternateContent xmlns:mc="http://schemas.openxmlformats.org/markup-compatibility/2006" xmlns:p14="http://schemas.microsoft.com/office/powerpoint/2010/main">
+    <mc:Choice Requires="p14">
+      <p:transition p14:dur="0"/>
+    </mc:Choice>
+    <mc:Fallback xmlns="">
+      <p:transition xmlns:p14="http://schemas.microsoft.com/office/powerpoint/2010/main"/>
+    </mc:Fallback>
+  </mc:AlternateContent>
+  <p:timing>
+    <p:tnLst>
+      <p:par>
+        <p:cTn xmlns:p14="http://schemas.microsoft.com/office/powerpoint/2010/main" id="1" dur="indefinite" restart="never" nodeType="tmRoot"/>
+      </p:par>
+    </p:tnLst>
+  </p:timing>
+</p:sld>
+</file>
+
+<file path=ppt/slides/slide6.xml><?xml version="1.0" encoding="utf-8"?>
+<p:sld xmlns:a="http://schemas.openxmlformats.org/drawingml/2006/main" xmlns:r="http://schemas.openxmlformats.org/officeDocument/2006/relationships" xmlns:p="http://schemas.openxmlformats.org/presentationml/2006/main">
+  <p:cSld>
+    <p:spTree>
+      <p:nvGrpSpPr>
+        <p:cNvPr id="1" name=""/>
+        <p:cNvGrpSpPr/>
+        <p:nvPr/>
+      </p:nvGrpSpPr>
+      <p:grpSpPr>
+        <a:xfrm>
+          <a:off x="0" y="0"/>
+          <a:ext cx="0" cy="0"/>
+          <a:chOff x="0" y="0"/>
+          <a:chExt cx="0" cy="0"/>
+        </a:xfrm>
+      </p:grpSpPr>
+      <p:sp>
+        <p:nvSpPr>
+          <p:cNvPr id="2" name="Title 1"/>
+          <p:cNvSpPr>
+            <a:spLocks noGrp="1"/>
+          </p:cNvSpPr>
+          <p:nvPr>
+            <p:ph type="title"/>
+          </p:nvPr>
+        </p:nvSpPr>
+        <p:spPr/>
+        <p:txBody>
+          <a:bodyPr/>
+          <a:lstStyle/>
+          <a:p>
+            <a:r>
+              <a:rPr lang="en-US" dirty="0" err="1" smtClean="0"/>
+              <a:t>Logstash</a:t>
+            </a:r>
+            <a:endParaRPr lang="en-US" dirty="0"/>
+          </a:p>
+        </p:txBody>
+      </p:sp>
+      <p:sp>
+        <p:nvSpPr>
+          <p:cNvPr id="3" name="Vertical Text Placeholder 2"/>
+          <p:cNvSpPr>
+            <a:spLocks noGrp="1"/>
+          </p:cNvSpPr>
+          <p:nvPr>
+            <p:ph type="body" orient="vert" idx="1"/>
+          </p:nvPr>
+        </p:nvSpPr>
+        <p:spPr/>
+        <p:txBody>
+          <a:bodyPr/>
+          <a:lstStyle/>
+          <a:p>
+            <a:pPr marL="0" indent="0" algn="ctr">
+              <a:buNone/>
+            </a:pPr>
+            <a:endParaRPr lang="en-US" dirty="0" smtClean="0"/>
+          </a:p>
+          <a:p>
+            <a:pPr marL="0" indent="0" algn="ctr">
+              <a:buNone/>
+            </a:pPr>
+            <a:r>
+              <a:rPr lang="en-US" dirty="0" smtClean="0"/>
+              <a:t>Open Source Centralized Logging Manager</a:t>
+            </a:r>
+            <a:endParaRPr lang="en-US" dirty="0"/>
+          </a:p>
+          <a:p>
+            <a:pPr marL="0" indent="0" algn="ctr">
+              <a:buNone/>
+            </a:pPr>
+            <a:endParaRPr lang="en-US" dirty="0" smtClean="0"/>
+          </a:p>
+          <a:p>
+            <a:pPr marL="0" indent="0" algn="ctr">
+              <a:buNone/>
+            </a:pPr>
+            <a:r>
+              <a:rPr lang="en-US" dirty="0" smtClean="0"/>
+              <a:t>Apache 2.0 </a:t>
+            </a:r>
+            <a:r>
+              <a:rPr lang="en-US" dirty="0" smtClean="0"/>
+              <a:t>License</a:t>
+            </a:r>
+          </a:p>
+          <a:p>
+            <a:pPr marL="0" indent="0" algn="ctr">
+              <a:buNone/>
+            </a:pPr>
+            <a:endParaRPr lang="en-US" dirty="0"/>
+          </a:p>
+          <a:p>
+            <a:pPr marL="0" indent="0" algn="ctr">
+              <a:buNone/>
+            </a:pPr>
+            <a:r>
+              <a:rPr lang="en-US" dirty="0" smtClean="0"/>
+              <a:t>Written by @</a:t>
+            </a:r>
+            <a:r>
+              <a:rPr lang="en-US" dirty="0" err="1" smtClean="0"/>
+              <a:t>jordansissel</a:t>
+            </a:r>
+            <a:endParaRPr lang="en-US" dirty="0"/>
+          </a:p>
+        </p:txBody>
+      </p:sp>
+    </p:spTree>
+    <p:extLst>
+      <p:ext uri="{BB962C8B-B14F-4D97-AF65-F5344CB8AC3E}">
+        <p14:creationId xmlns:p14="http://schemas.microsoft.com/office/powerpoint/2010/main" val="836353226"/>
+      </p:ext>
+    </p:extLst>
+  </p:cSld>
+  <p:clrMapOvr>
+    <a:masterClrMapping/>
+  </p:clrMapOvr>
+  <mc:AlternateContent xmlns:mc="http://schemas.openxmlformats.org/markup-compatibility/2006" xmlns:p14="http://schemas.microsoft.com/office/powerpoint/2010/main">
+    <mc:Choice Requires="p14">
+      <p:transition p14:dur="0"/>
+    </mc:Choice>
+    <mc:Fallback xmlns="">
+      <p:transition xmlns:p14="http://schemas.microsoft.com/office/powerpoint/2010/main"/>
+    </mc:Fallback>
+  </mc:AlternateContent>
+</p:sld>
+</file>
+
+<file path=ppt/slides/slide7.xml><?xml version="1.0" encoding="utf-8"?>
+<p:sld xmlns:a="http://schemas.openxmlformats.org/drawingml/2006/main" xmlns:r="http://schemas.openxmlformats.org/officeDocument/2006/relationships" xmlns:p="http://schemas.openxmlformats.org/presentationml/2006/main">
+  <p:cSld>
+    <p:spTree>
+      <p:nvGrpSpPr>
+        <p:cNvPr id="1" name=""/>
+        <p:cNvGrpSpPr/>
+        <p:nvPr/>
+      </p:nvGrpSpPr>
+      <p:grpSpPr>
+        <a:xfrm>
+          <a:off x="0" y="0"/>
+          <a:ext cx="0" cy="0"/>
+          <a:chOff x="0" y="0"/>
+          <a:chExt cx="0" cy="0"/>
+        </a:xfrm>
+      </p:grpSpPr>
+      <p:sp>
+        <p:nvSpPr>
+          <p:cNvPr id="2" name="Title 1"/>
+          <p:cNvSpPr>
+            <a:spLocks noGrp="1"/>
+          </p:cNvSpPr>
+          <p:nvPr>
+            <p:ph type="title"/>
+          </p:nvPr>
+        </p:nvSpPr>
+        <p:spPr/>
+        <p:txBody>
+          <a:bodyPr/>
+          <a:lstStyle/>
+          <a:p>
+            <a:pPr algn="ctr"/>
+            <a:r>
+              <a:rPr lang="en-US" dirty="0" smtClean="0"/>
+              <a:t>What does </a:t>
+            </a:r>
+            <a:r>
+              <a:rPr lang="en-US" dirty="0" err="1" smtClean="0"/>
+              <a:t>Logstash</a:t>
+            </a:r>
+            <a:r>
+              <a:rPr lang="en-US" dirty="0" smtClean="0"/>
+              <a:t> do?</a:t>
+            </a:r>
+            <a:endParaRPr lang="en-US" dirty="0"/>
+          </a:p>
+        </p:txBody>
+      </p:sp>
+      <p:sp>
+        <p:nvSpPr>
+          <p:cNvPr id="3" name="Vertical Text Placeholder 2"/>
+          <p:cNvSpPr>
+            <a:spLocks noGrp="1"/>
+          </p:cNvSpPr>
+          <p:nvPr>
+            <p:ph type="body" orient="vert" idx="1"/>
+          </p:nvPr>
+        </p:nvSpPr>
+        <p:spPr/>
+        <p:txBody>
+          <a:bodyPr/>
+          <a:lstStyle/>
+          <a:p>
+            <a:pPr marL="0" indent="0" algn="ctr">
+              <a:buNone/>
+            </a:pPr>
+            <a:endParaRPr lang="en-US" dirty="0" smtClean="0"/>
+          </a:p>
+          <a:p>
+            <a:pPr marL="0" indent="0" algn="ctr">
+              <a:buNone/>
+            </a:pPr>
+            <a:r>
+              <a:rPr lang="en-US" dirty="0" smtClean="0"/>
+              <a:t>Ships logs from any source</a:t>
+            </a:r>
+          </a:p>
+          <a:p>
+            <a:pPr marL="0" indent="0" algn="ctr">
+              <a:buNone/>
+            </a:pPr>
+            <a:r>
+              <a:rPr lang="en-US" dirty="0" smtClean="0"/>
+              <a:t>Parse them</a:t>
+            </a:r>
+          </a:p>
+          <a:p>
+            <a:pPr marL="0" indent="0" algn="ctr">
+              <a:buNone/>
+            </a:pPr>
+            <a:r>
+              <a:rPr lang="en-US" dirty="0" smtClean="0"/>
+              <a:t>Get the right timestamp</a:t>
+            </a:r>
+          </a:p>
+          <a:p>
+            <a:pPr marL="0" indent="0" algn="ctr">
+              <a:buNone/>
+            </a:pPr>
+            <a:r>
+              <a:rPr lang="en-US" dirty="0" smtClean="0"/>
+              <a:t>Index them</a:t>
+            </a:r>
+          </a:p>
+          <a:p>
+            <a:pPr marL="0" indent="0" algn="ctr">
+              <a:buNone/>
+            </a:pPr>
+            <a:r>
+              <a:rPr lang="en-US" dirty="0" smtClean="0"/>
+              <a:t>Allows you to search them</a:t>
+            </a:r>
+            <a:endParaRPr lang="en-US" dirty="0"/>
+          </a:p>
+        </p:txBody>
+      </p:sp>
+    </p:spTree>
+    <p:extLst>
+      <p:ext uri="{BB962C8B-B14F-4D97-AF65-F5344CB8AC3E}">
+        <p14:creationId xmlns:p14="http://schemas.microsoft.com/office/powerpoint/2010/main" val="3499055205"/>
+      </p:ext>
+    </p:extLst>
+  </p:cSld>
+  <p:clrMapOvr>
+    <a:masterClrMapping/>
+  </p:clrMapOvr>
+  <mc:AlternateContent xmlns:mc="http://schemas.openxmlformats.org/markup-compatibility/2006" xmlns:p14="http://schemas.microsoft.com/office/powerpoint/2010/main">
+    <mc:Choice Requires="p14">
+      <p:transition p14:dur="0"/>
+    </mc:Choice>
+    <mc:Fallback xmlns="">
+      <p:transition xmlns:p14="http://schemas.microsoft.com/office/powerpoint/2010/main"/>
+    </mc:Fallback>
+  </mc:AlternateContent>
+</p:sld>
+</file>
+
+<file path=ppt/slides/slide8.xml><?xml version="1.0" encoding="utf-8"?>
+<p:sld xmlns:a="http://schemas.openxmlformats.org/drawingml/2006/main" xmlns:r="http://schemas.openxmlformats.org/officeDocument/2006/relationships" xmlns:p="http://schemas.openxmlformats.org/presentationml/2006/main">
+  <p:cSld>
+    <p:spTree>
+      <p:nvGrpSpPr>
+        <p:cNvPr id="1" name=""/>
+        <p:cNvGrpSpPr/>
+        <p:nvPr/>
+      </p:nvGrpSpPr>
+      <p:grpSpPr>
+        <a:xfrm>
+          <a:off x="0" y="0"/>
+          <a:ext cx="0" cy="0"/>
+          <a:chOff x="0" y="0"/>
+          <a:chExt cx="0" cy="0"/>
+        </a:xfrm>
+      </p:grpSpPr>
+      <p:sp>
+        <p:nvSpPr>
+          <p:cNvPr id="2" name="Title 1"/>
+          <p:cNvSpPr>
+            <a:spLocks noGrp="1"/>
+          </p:cNvSpPr>
+          <p:nvPr>
+            <p:ph type="title"/>
+          </p:nvPr>
+        </p:nvSpPr>
+        <p:spPr/>
+        <p:txBody>
+          <a:bodyPr/>
+          <a:lstStyle/>
+          <a:p>
+            <a:r>
+              <a:rPr lang="en-US" dirty="0" smtClean="0"/>
+              <a:t>How does </a:t>
+            </a:r>
+            <a:r>
+              <a:rPr lang="en-US" dirty="0" err="1" smtClean="0"/>
+              <a:t>Logstash</a:t>
+            </a:r>
+            <a:r>
+              <a:rPr lang="en-US" dirty="0" smtClean="0"/>
+              <a:t> get the logs</a:t>
+            </a:r>
+            <a:endParaRPr lang="en-US" dirty="0"/>
+          </a:p>
+        </p:txBody>
+      </p:sp>
+      <p:sp>
+        <p:nvSpPr>
+          <p:cNvPr id="3" name="Vertical Text Placeholder 2"/>
+          <p:cNvSpPr>
+            <a:spLocks noGrp="1"/>
+          </p:cNvSpPr>
+          <p:nvPr>
+            <p:ph type="body" orient="vert" idx="1"/>
+          </p:nvPr>
+        </p:nvSpPr>
+        <p:spPr/>
+        <p:txBody>
+          <a:bodyPr/>
+          <a:lstStyle/>
+          <a:p>
+            <a:r>
+              <a:rPr lang="en-US" dirty="0" smtClean="0"/>
+              <a:t>TCP/UDP</a:t>
+            </a:r>
+          </a:p>
+          <a:p>
+            <a:r>
+              <a:rPr lang="en-US" dirty="0" smtClean="0"/>
+              <a:t>Files</a:t>
+            </a:r>
+          </a:p>
+          <a:p>
+            <a:r>
+              <a:rPr lang="en-US" dirty="0" smtClean="0"/>
+              <a:t>Syslog</a:t>
+            </a:r>
+          </a:p>
+          <a:p>
+            <a:r>
+              <a:rPr lang="en-US" dirty="0" smtClean="0"/>
+              <a:t>Microsoft Windows </a:t>
+            </a:r>
+            <a:r>
+              <a:rPr lang="en-US" dirty="0" err="1" smtClean="0"/>
+              <a:t>EventLogs</a:t>
+            </a:r>
+            <a:endParaRPr lang="en-US" dirty="0" smtClean="0"/>
+          </a:p>
+          <a:p>
+            <a:r>
+              <a:rPr lang="en-US" dirty="0" smtClean="0"/>
+              <a:t>STDIN</a:t>
+            </a:r>
+          </a:p>
+          <a:p>
+            <a:r>
+              <a:rPr lang="en-US" dirty="0" err="1" smtClean="0"/>
+              <a:t>Websocket</a:t>
+            </a:r>
+            <a:endParaRPr lang="en-US" dirty="0" smtClean="0"/>
+          </a:p>
+          <a:p>
+            <a:r>
+              <a:rPr lang="en-US" dirty="0" err="1" smtClean="0"/>
+              <a:t>zeromq</a:t>
+            </a:r>
+            <a:endParaRPr lang="en-US" dirty="0" smtClean="0"/>
+          </a:p>
+          <a:p>
+            <a:r>
+              <a:rPr lang="en-US" dirty="0" smtClean="0"/>
+              <a:t>Plus many more</a:t>
+            </a:r>
+          </a:p>
+          <a:p>
+            <a:r>
+              <a:rPr lang="en-US" dirty="0" smtClean="0"/>
+              <a:t>And it’s extensible (you can write your own)</a:t>
+            </a:r>
+            <a:endParaRPr lang="en-US" dirty="0"/>
+          </a:p>
+        </p:txBody>
+      </p:sp>
+    </p:spTree>
+    <p:extLst>
+      <p:ext uri="{BB962C8B-B14F-4D97-AF65-F5344CB8AC3E}">
+        <p14:creationId xmlns:p14="http://schemas.microsoft.com/office/powerpoint/2010/main" val="714878376"/>
+      </p:ext>
+    </p:extLst>
+  </p:cSld>
+  <p:clrMapOvr>
+    <a:masterClrMapping/>
+  </p:clrMapOvr>
+  <mc:AlternateContent xmlns:mc="http://schemas.openxmlformats.org/markup-compatibility/2006" xmlns:p14="http://schemas.microsoft.com/office/powerpoint/2010/main">
+    <mc:Choice Requires="p14">
+      <p:transition p14:dur="0"/>
+    </mc:Choice>
+    <mc:Fallback xmlns="">
+      <p:transition xmlns:p14="http://schemas.microsoft.com/office/powerpoint/2010/main"/>
+    </mc:Fallback>
+  </mc:AlternateContent>
+</p:sld>
+</file>
+
 <file path=ppt/slides/slide9.xml><?xml version="1.0" encoding="utf-8"?>
 <p:sld xmlns:a="http://schemas.openxmlformats.org/drawingml/2006/main" xmlns:r="http://schemas.openxmlformats.org/officeDocument/2006/relationships" xmlns:p="http://schemas.openxmlformats.org/presentationml/2006/main">
   <p:cSld>
@@ -13043,15 +13985,7 @@
           <a:p>
             <a:r>
               <a:rPr lang="en-US" dirty="0" smtClean="0"/>
-              <a:t>How can </a:t>
-            </a:r>
-            <a:r>
-              <a:rPr lang="en-US" dirty="0" err="1" smtClean="0"/>
-              <a:t>Logstash</a:t>
-            </a:r>
-            <a:r>
-              <a:rPr lang="en-US" dirty="0" smtClean="0"/>
-              <a:t> output data</a:t>
+              <a:t>Parse the input</a:t>
             </a:r>
             <a:endParaRPr lang="en-US" dirty="0"/>
           </a:p>
@@ -13073,67 +14007,45 @@
           <a:lstStyle/>
           <a:p>
             <a:r>
+              <a:rPr lang="en-US" dirty="0" err="1" smtClean="0"/>
+              <a:t>Json</a:t>
+            </a:r>
+            <a:endParaRPr lang="en-US" dirty="0" smtClean="0"/>
+          </a:p>
+          <a:p>
+            <a:r>
+              <a:rPr lang="en-US" dirty="0" err="1" smtClean="0"/>
+              <a:t>Csv</a:t>
+            </a:r>
+            <a:endParaRPr lang="en-US" dirty="0" smtClean="0"/>
+          </a:p>
+          <a:p>
+            <a:r>
               <a:rPr lang="en-US" dirty="0" smtClean="0"/>
-              <a:t>TCP/UDP</a:t>
+              <a:t>Xml</a:t>
             </a:r>
           </a:p>
           <a:p>
             <a:r>
               <a:rPr lang="en-US" dirty="0" smtClean="0"/>
-              <a:t>Email</a:t>
+              <a:t>Multi-line (Stack traces from file input)</a:t>
             </a:r>
           </a:p>
           <a:p>
             <a:r>
               <a:rPr lang="en-US" dirty="0" smtClean="0"/>
-              <a:t>Files</a:t>
-            </a:r>
-          </a:p>
-          <a:p>
+              <a:t>Regex</a:t>
+            </a:r>
+          </a:p>
+          <a:p>
+            <a:r>
+              <a:rPr lang="en-US" dirty="0" err="1" smtClean="0"/>
+              <a:t>Grok</a:t>
+            </a:r>
             <a:r>
               <a:rPr lang="en-US" dirty="0" smtClean="0"/>
-              <a:t>HTTP</a:t>
-            </a:r>
-          </a:p>
-          <a:p>
-            <a:r>
-              <a:rPr lang="en-US" dirty="0" err="1" smtClean="0"/>
-              <a:t>Nagios</a:t>
-            </a:r>
-            <a:r>
-              <a:rPr lang="en-US" dirty="0" smtClean="0"/>
-              <a:t> (IT Infrastructure Monitoring tool)</a:t>
-            </a:r>
-          </a:p>
-          <a:p>
-            <a:r>
-              <a:rPr lang="en-US" dirty="0" smtClean="0"/>
-              <a:t>Alerting tools (</a:t>
-            </a:r>
-            <a:r>
-              <a:rPr lang="en-US" dirty="0" err="1" smtClean="0"/>
-              <a:t>Hipchat</a:t>
-            </a:r>
-            <a:r>
-              <a:rPr lang="en-US" dirty="0" smtClean="0"/>
-              <a:t>)</a:t>
-            </a:r>
-          </a:p>
-          <a:p>
-            <a:r>
-              <a:rPr lang="en-US" dirty="0" smtClean="0"/>
-              <a:t>Graphing suites (</a:t>
-            </a:r>
-            <a:r>
-              <a:rPr lang="en-US" dirty="0" err="1" smtClean="0"/>
-              <a:t>StatsD</a:t>
-            </a:r>
-            <a:r>
-              <a:rPr lang="en-US" dirty="0" smtClean="0"/>
-              <a:t>, Graphite)</a:t>
-            </a:r>
-          </a:p>
-          <a:p>
+              <a:t> (Regex on steroids)</a:t>
+            </a:r>
             <a:endParaRPr lang="en-US" dirty="0"/>
           </a:p>
         </p:txBody>
@@ -13141,7 +14053,7 @@
     </p:spTree>
     <p:extLst>
       <p:ext uri="{BB962C8B-B14F-4D97-AF65-F5344CB8AC3E}">
-        <p14:creationId xmlns:p14="http://schemas.microsoft.com/office/powerpoint/2010/main" val="1664774299"/>
+        <p14:creationId xmlns:p14="http://schemas.microsoft.com/office/powerpoint/2010/main" val="3376550989"/>
       </p:ext>
     </p:extLst>
   </p:cSld>

</xml_diff>